<commit_message>
adding R function and refined figure1 to repository
</commit_message>
<xml_diff>
--- a/figure1.pptx
+++ b/figure1.pptx
@@ -244,7 +244,7 @@
           <a:p>
             <a:fld id="{4F7F8494-7B3A-FA4B-BC90-C3FBA6E843BB}" type="datetimeFigureOut">
               <a:rPr lang="en-US" smtClean="0"/>
-              <a:t>3/15/17</a:t>
+              <a:t>3/16/2017</a:t>
             </a:fld>
             <a:endParaRPr lang="en-US"/>
           </a:p>
@@ -414,7 +414,7 @@
           <a:p>
             <a:fld id="{4F7F8494-7B3A-FA4B-BC90-C3FBA6E843BB}" type="datetimeFigureOut">
               <a:rPr lang="en-US" smtClean="0"/>
-              <a:t>3/15/17</a:t>
+              <a:t>3/16/2017</a:t>
             </a:fld>
             <a:endParaRPr lang="en-US"/>
           </a:p>
@@ -594,7 +594,7 @@
           <a:p>
             <a:fld id="{4F7F8494-7B3A-FA4B-BC90-C3FBA6E843BB}" type="datetimeFigureOut">
               <a:rPr lang="en-US" smtClean="0"/>
-              <a:t>3/15/17</a:t>
+              <a:t>3/16/2017</a:t>
             </a:fld>
             <a:endParaRPr lang="en-US"/>
           </a:p>
@@ -764,7 +764,7 @@
           <a:p>
             <a:fld id="{4F7F8494-7B3A-FA4B-BC90-C3FBA6E843BB}" type="datetimeFigureOut">
               <a:rPr lang="en-US" smtClean="0"/>
-              <a:t>3/15/17</a:t>
+              <a:t>3/16/2017</a:t>
             </a:fld>
             <a:endParaRPr lang="en-US"/>
           </a:p>
@@ -1010,7 +1010,7 @@
           <a:p>
             <a:fld id="{4F7F8494-7B3A-FA4B-BC90-C3FBA6E843BB}" type="datetimeFigureOut">
               <a:rPr lang="en-US" smtClean="0"/>
-              <a:t>3/15/17</a:t>
+              <a:t>3/16/2017</a:t>
             </a:fld>
             <a:endParaRPr lang="en-US"/>
           </a:p>
@@ -1242,7 +1242,7 @@
           <a:p>
             <a:fld id="{4F7F8494-7B3A-FA4B-BC90-C3FBA6E843BB}" type="datetimeFigureOut">
               <a:rPr lang="en-US" smtClean="0"/>
-              <a:t>3/15/17</a:t>
+              <a:t>3/16/2017</a:t>
             </a:fld>
             <a:endParaRPr lang="en-US"/>
           </a:p>
@@ -1609,7 +1609,7 @@
           <a:p>
             <a:fld id="{4F7F8494-7B3A-FA4B-BC90-C3FBA6E843BB}" type="datetimeFigureOut">
               <a:rPr lang="en-US" smtClean="0"/>
-              <a:t>3/15/17</a:t>
+              <a:t>3/16/2017</a:t>
             </a:fld>
             <a:endParaRPr lang="en-US"/>
           </a:p>
@@ -1727,7 +1727,7 @@
           <a:p>
             <a:fld id="{4F7F8494-7B3A-FA4B-BC90-C3FBA6E843BB}" type="datetimeFigureOut">
               <a:rPr lang="en-US" smtClean="0"/>
-              <a:t>3/15/17</a:t>
+              <a:t>3/16/2017</a:t>
             </a:fld>
             <a:endParaRPr lang="en-US"/>
           </a:p>
@@ -1822,7 +1822,7 @@
           <a:p>
             <a:fld id="{4F7F8494-7B3A-FA4B-BC90-C3FBA6E843BB}" type="datetimeFigureOut">
               <a:rPr lang="en-US" smtClean="0"/>
-              <a:t>3/15/17</a:t>
+              <a:t>3/16/2017</a:t>
             </a:fld>
             <a:endParaRPr lang="en-US"/>
           </a:p>
@@ -2099,7 +2099,7 @@
           <a:p>
             <a:fld id="{4F7F8494-7B3A-FA4B-BC90-C3FBA6E843BB}" type="datetimeFigureOut">
               <a:rPr lang="en-US" smtClean="0"/>
-              <a:t>3/15/17</a:t>
+              <a:t>3/16/2017</a:t>
             </a:fld>
             <a:endParaRPr lang="en-US"/>
           </a:p>
@@ -2352,7 +2352,7 @@
           <a:p>
             <a:fld id="{4F7F8494-7B3A-FA4B-BC90-C3FBA6E843BB}" type="datetimeFigureOut">
               <a:rPr lang="en-US" smtClean="0"/>
-              <a:t>3/15/17</a:t>
+              <a:t>3/16/2017</a:t>
             </a:fld>
             <a:endParaRPr lang="en-US"/>
           </a:p>
@@ -2565,7 +2565,7 @@
           <a:p>
             <a:fld id="{4F7F8494-7B3A-FA4B-BC90-C3FBA6E843BB}" type="datetimeFigureOut">
               <a:rPr lang="en-US" smtClean="0"/>
-              <a:t>3/15/17</a:t>
+              <a:t>3/16/2017</a:t>
             </a:fld>
             <a:endParaRPr lang="en-US"/>
           </a:p>
@@ -2996,7 +2996,6 @@
               <a:rPr lang="en-US" sz="2800" dirty="0" smtClean="0"/>
               <a:t>Known </a:t>
             </a:r>
-            <a:endParaRPr lang="en-US" sz="2800" dirty="0" smtClean="0"/>
           </a:p>
           <a:p>
             <a:r>
@@ -4113,11 +4112,7 @@
           <a:p>
             <a:r>
               <a:rPr lang="en-US" dirty="0" smtClean="0"/>
-              <a:t>consistent </a:t>
-            </a:r>
-            <a:r>
-              <a:rPr lang="en-US" dirty="0" smtClean="0"/>
-              <a:t>With Y, G, and </a:t>
+              <a:t>consistent With Y, G, and </a:t>
             </a:r>
           </a:p>
           <a:p>
@@ -5115,11 +5110,7 @@
           <a:p>
             <a:r>
               <a:rPr lang="en-US" dirty="0" smtClean="0"/>
-              <a:t>consistent </a:t>
-            </a:r>
-            <a:r>
-              <a:rPr lang="en-US" dirty="0" smtClean="0"/>
-              <a:t>With Y, G, and </a:t>
+              <a:t>consistent With Y, G, and </a:t>
             </a:r>
           </a:p>
           <a:p>
@@ -5154,6 +5145,34 @@
 <file path=ppt/slides/slide2.xml><?xml version="1.0" encoding="utf-8"?>
 <p:sld xmlns:a="http://schemas.openxmlformats.org/drawingml/2006/main" xmlns:r="http://schemas.openxmlformats.org/officeDocument/2006/relationships" xmlns:p="http://schemas.openxmlformats.org/presentationml/2006/main">
   <p:cSld>
+    <p:bg>
+      <p:bgPr>
+        <a:gradFill>
+          <a:gsLst>
+            <a:gs pos="0">
+              <a:schemeClr val="accent1">
+                <a:lumMod val="5000"/>
+                <a:lumOff val="95000"/>
+              </a:schemeClr>
+            </a:gs>
+            <a:gs pos="0">
+              <a:schemeClr val="accent1">
+                <a:lumMod val="45000"/>
+                <a:lumOff val="55000"/>
+              </a:schemeClr>
+            </a:gs>
+            <a:gs pos="0">
+              <a:srgbClr val="7186BD"/>
+            </a:gs>
+            <a:gs pos="100000">
+              <a:srgbClr val="5B75B2"/>
+            </a:gs>
+          </a:gsLst>
+          <a:lin ang="5400000" scaled="1"/>
+        </a:gradFill>
+        <a:effectLst/>
+      </p:bgPr>
+    </p:bg>
     <p:spTree>
       <p:nvGrpSpPr>
         <p:cNvPr id="1" name=""/>
@@ -5170,20 +5189,20 @@
       </p:grpSpPr>
       <p:sp>
         <p:nvSpPr>
-          <p:cNvPr id="4" name="Rounded Rectangle 3"/>
+          <p:cNvPr id="35" name="Rounded Rectangle 34"/>
           <p:cNvSpPr/>
           <p:nvPr/>
         </p:nvSpPr>
         <p:spPr>
-          <a:xfrm rot="5400000">
-            <a:off x="5864089" y="-3916020"/>
-            <a:ext cx="894524" cy="12821484"/>
+          <a:xfrm>
+            <a:off x="116883" y="171042"/>
+            <a:ext cx="3917637" cy="6545398"/>
           </a:xfrm>
           <a:prstGeom prst="roundRect">
             <a:avLst/>
           </a:prstGeom>
           <a:solidFill>
-            <a:srgbClr val="53595C"/>
+            <a:srgbClr val="45629E"/>
           </a:solidFill>
         </p:spPr>
         <p:style>
@@ -5207,24 +5226,20 @@
           <a:lstStyle/>
           <a:p>
             <a:pPr algn="ctr"/>
-            <a:endParaRPr lang="en-US">
-              <a:solidFill>
-                <a:srgbClr val="FF0000"/>
-              </a:solidFill>
-            </a:endParaRPr>
+            <a:endParaRPr lang="en-AU"/>
           </a:p>
         </p:txBody>
       </p:sp>
       <p:sp>
         <p:nvSpPr>
-          <p:cNvPr id="5" name="TextBox 4"/>
+          <p:cNvPr id="6" name="TextBox 5"/>
           <p:cNvSpPr txBox="1"/>
           <p:nvPr/>
         </p:nvSpPr>
         <p:spPr>
           <a:xfrm>
-            <a:off x="588480" y="0"/>
-            <a:ext cx="4428710" cy="954107"/>
+            <a:off x="4245557" y="1131034"/>
+            <a:ext cx="5188748" cy="584775"/>
           </a:xfrm>
           <a:prstGeom prst="rect">
             <a:avLst/>
@@ -5238,36 +5253,75 @@
           <a:lstStyle/>
           <a:p>
             <a:r>
-              <a:rPr lang="en-US" sz="2800" b="1" smtClean="0">
+              <a:rPr lang="en-US" sz="3200" b="1" dirty="0" smtClean="0">
                 <a:solidFill>
-                  <a:srgbClr val="FF0000"/>
+                  <a:schemeClr val="bg1"/>
                 </a:solidFill>
+                <a:effectLst>
+                  <a:outerShdw blurRad="38100" dist="38100" dir="2700000" algn="tl">
+                    <a:srgbClr val="000000">
+                      <a:alpha val="43137"/>
+                    </a:srgbClr>
+                  </a:outerShdw>
+                </a:effectLst>
               </a:rPr>
               <a:t>Known </a:t>
             </a:r>
-          </a:p>
-          <a:p>
-            <a:r>
-              <a:rPr lang="en-US" sz="2800" b="1" dirty="0" smtClean="0">
+            <a:r>
+              <a:rPr lang="en-US" sz="3200" b="1" dirty="0">
                 <a:solidFill>
-                  <a:srgbClr val="FF0000"/>
+                  <a:schemeClr val="bg1"/>
                 </a:solidFill>
+                <a:effectLst>
+                  <a:outerShdw blurRad="38100" dist="38100" dir="2700000" algn="tl">
+                    <a:srgbClr val="000000">
+                      <a:alpha val="43137"/>
+                    </a:srgbClr>
+                  </a:outerShdw>
+                </a:effectLst>
+              </a:rPr>
+              <a:t> </a:t>
+            </a:r>
+            <a:r>
+              <a:rPr lang="en-US" sz="3200" b="1" dirty="0" smtClean="0">
+                <a:solidFill>
+                  <a:schemeClr val="bg1"/>
+                </a:solidFill>
+                <a:effectLst>
+                  <a:outerShdw blurRad="38100" dist="38100" dir="2700000" algn="tl">
+                    <a:srgbClr val="000000">
+                      <a:alpha val="43137"/>
+                    </a:srgbClr>
+                  </a:outerShdw>
+                </a:effectLst>
               </a:rPr>
               <a:t>Information</a:t>
             </a:r>
+            <a:endParaRPr lang="en-US" sz="3200" b="1" dirty="0">
+              <a:solidFill>
+                <a:schemeClr val="bg1"/>
+              </a:solidFill>
+              <a:effectLst>
+                <a:outerShdw blurRad="38100" dist="38100" dir="2700000" algn="tl">
+                  <a:srgbClr val="000000">
+                    <a:alpha val="43137"/>
+                  </a:srgbClr>
+                </a:outerShdw>
+              </a:effectLst>
+            </a:endParaRPr>
           </a:p>
         </p:txBody>
       </p:sp>
       <p:sp>
         <p:nvSpPr>
-          <p:cNvPr id="7" name="TextBox 6"/>
+          <p:cNvPr id="9" name="TextBox 8"/>
           <p:cNvSpPr txBox="1"/>
           <p:nvPr/>
         </p:nvSpPr>
         <p:spPr>
           <a:xfrm>
-            <a:off x="6940419" y="364243"/>
-            <a:ext cx="4428710" cy="523220"/>
+            <a:off x="4533550" y="1814091"/>
+            <a:ext cx="1363599" cy="523220"/>
           </a:xfrm>
           <a:prstGeom prst="rect">
             <a:avLst/>
@@ -5281,26 +5335,57 @@
           <a:lstStyle/>
           <a:p>
             <a:r>
-              <a:rPr lang="en-US" sz="2800" b="1" dirty="0" smtClean="0">
+              <a:rPr lang="en-US" sz="1400" dirty="0" smtClean="0">
                 <a:solidFill>
-                  <a:srgbClr val="FF0000"/>
+                  <a:schemeClr val="bg1"/>
                 </a:solidFill>
               </a:rPr>
-              <a:t>Scenario 2</a:t>
-            </a:r>
+              <a:t>Disease </a:t>
+            </a:r>
+          </a:p>
+          <a:p>
+            <a:r>
+              <a:rPr lang="en-US" sz="1400" dirty="0" smtClean="0">
+                <a:solidFill>
+                  <a:schemeClr val="bg1"/>
+                </a:solidFill>
+              </a:rPr>
+              <a:t>Status (</a:t>
+            </a:r>
+            <a:r>
+              <a:rPr lang="en-US" sz="1400" b="1" dirty="0" smtClean="0">
+                <a:solidFill>
+                  <a:schemeClr val="bg1"/>
+                </a:solidFill>
+              </a:rPr>
+              <a:t>Y</a:t>
+            </a:r>
+            <a:r>
+              <a:rPr lang="en-US" sz="1400" dirty="0" smtClean="0">
+                <a:solidFill>
+                  <a:schemeClr val="bg1"/>
+                </a:solidFill>
+              </a:rPr>
+              <a:t>)</a:t>
+            </a:r>
+            <a:endParaRPr lang="en-US" sz="1400" dirty="0">
+              <a:solidFill>
+                <a:schemeClr val="bg1"/>
+              </a:solidFill>
+            </a:endParaRPr>
           </a:p>
         </p:txBody>
       </p:sp>
       <p:sp>
         <p:nvSpPr>
-          <p:cNvPr id="8" name="TextBox 7"/>
+          <p:cNvPr id="10" name="TextBox 9"/>
           <p:cNvSpPr txBox="1"/>
           <p:nvPr/>
         </p:nvSpPr>
         <p:spPr>
           <a:xfrm>
-            <a:off x="3685766" y="367773"/>
-            <a:ext cx="4428710" cy="523220"/>
+            <a:off x="4299064" y="4051631"/>
+            <a:ext cx="3390991" cy="369332"/>
           </a:xfrm>
           <a:prstGeom prst="rect">
             <a:avLst/>
@@ -5314,13 +5399,3573 @@
           <a:lstStyle/>
           <a:p>
             <a:r>
-              <a:rPr lang="en-US" sz="2800" b="1" dirty="0" smtClean="0">
+              <a:rPr lang="en-US" dirty="0" smtClean="0">
+                <a:solidFill>
+                  <a:schemeClr val="bg1"/>
+                </a:solidFill>
+              </a:rPr>
+              <a:t>Findings from QTL </a:t>
+            </a:r>
+            <a:r>
+              <a:rPr lang="en-US" dirty="0" smtClean="0">
+                <a:solidFill>
+                  <a:schemeClr val="bg1"/>
+                </a:solidFill>
+              </a:rPr>
+              <a:t>Mapping </a:t>
+            </a:r>
+            <a:r>
+              <a:rPr lang="en-US" dirty="0">
+                <a:solidFill>
+                  <a:schemeClr val="bg1"/>
+                </a:solidFill>
+              </a:rPr>
+              <a:t>S</a:t>
+            </a:r>
+            <a:r>
+              <a:rPr lang="en-US" dirty="0" smtClean="0">
+                <a:solidFill>
+                  <a:schemeClr val="bg1"/>
+                </a:solidFill>
+              </a:rPr>
+              <a:t>tudy</a:t>
+            </a:r>
+            <a:endParaRPr lang="en-US" dirty="0">
+              <a:solidFill>
+                <a:schemeClr val="bg1"/>
+              </a:solidFill>
+            </a:endParaRPr>
+          </a:p>
+        </p:txBody>
+      </p:sp>
+      <p:sp>
+        <p:nvSpPr>
+          <p:cNvPr id="11" name="TextBox 10"/>
+          <p:cNvSpPr txBox="1"/>
+          <p:nvPr/>
+        </p:nvSpPr>
+        <p:spPr>
+          <a:xfrm>
+            <a:off x="6212645" y="1600130"/>
+            <a:ext cx="1483227" cy="738664"/>
+          </a:xfrm>
+          <a:prstGeom prst="rect">
+            <a:avLst/>
+          </a:prstGeom>
+          <a:noFill/>
+        </p:spPr>
+        <p:txBody>
+          <a:bodyPr wrap="none" rtlCol="0">
+            <a:spAutoFit/>
+          </a:bodyPr>
+          <a:lstStyle/>
+          <a:p>
+            <a:r>
+              <a:rPr lang="en-US" sz="1400" dirty="0" smtClean="0">
+                <a:solidFill>
+                  <a:schemeClr val="bg1"/>
+                </a:solidFill>
+              </a:rPr>
+              <a:t>Phased genotype </a:t>
+            </a:r>
+            <a:endParaRPr lang="en-US" sz="1400" dirty="0" smtClean="0">
+              <a:solidFill>
+                <a:schemeClr val="bg1"/>
+              </a:solidFill>
+            </a:endParaRPr>
+          </a:p>
+          <a:p>
+            <a:r>
+              <a:rPr lang="en-US" sz="1400" dirty="0">
+                <a:solidFill>
+                  <a:schemeClr val="bg1"/>
+                </a:solidFill>
+              </a:rPr>
+              <a:t>d</a:t>
+            </a:r>
+            <a:r>
+              <a:rPr lang="en-US" sz="1400" dirty="0" smtClean="0">
+                <a:solidFill>
+                  <a:schemeClr val="bg1"/>
+                </a:solidFill>
+              </a:rPr>
+              <a:t>ata</a:t>
+            </a:r>
+            <a:r>
+              <a:rPr lang="en-US" sz="1400" dirty="0" smtClean="0">
+                <a:solidFill>
+                  <a:schemeClr val="bg1"/>
+                </a:solidFill>
+              </a:rPr>
+              <a:t> </a:t>
+            </a:r>
+            <a:r>
+              <a:rPr lang="en-US" sz="1400" dirty="0" smtClean="0">
+                <a:solidFill>
+                  <a:schemeClr val="bg1"/>
+                </a:solidFill>
+              </a:rPr>
+              <a:t>in </a:t>
+            </a:r>
+            <a:r>
+              <a:rPr lang="en-US" sz="1400" dirty="0" smtClean="0">
+                <a:solidFill>
+                  <a:schemeClr val="bg1"/>
+                </a:solidFill>
+              </a:rPr>
+              <a:t>region </a:t>
+            </a:r>
+            <a:endParaRPr lang="en-US" sz="1400" dirty="0" smtClean="0">
+              <a:solidFill>
+                <a:schemeClr val="bg1"/>
+              </a:solidFill>
+            </a:endParaRPr>
+          </a:p>
+          <a:p>
+            <a:r>
+              <a:rPr lang="en-US" sz="1400" dirty="0" smtClean="0">
+                <a:solidFill>
+                  <a:schemeClr val="bg1"/>
+                </a:solidFill>
+              </a:rPr>
+              <a:t>of interest (</a:t>
+            </a:r>
+            <a:r>
+              <a:rPr lang="en-US" sz="1400" b="1" dirty="0" smtClean="0">
+                <a:solidFill>
+                  <a:schemeClr val="bg1"/>
+                </a:solidFill>
+              </a:rPr>
+              <a:t>G</a:t>
+            </a:r>
+            <a:r>
+              <a:rPr lang="en-US" sz="1400" dirty="0" smtClean="0">
+                <a:solidFill>
+                  <a:schemeClr val="bg1"/>
+                </a:solidFill>
+              </a:rPr>
+              <a:t>)</a:t>
+            </a:r>
+            <a:endParaRPr lang="en-US" sz="1400" dirty="0" smtClean="0">
+              <a:solidFill>
+                <a:schemeClr val="bg1"/>
+              </a:solidFill>
+            </a:endParaRPr>
+          </a:p>
+        </p:txBody>
+      </p:sp>
+      <p:graphicFrame>
+        <p:nvGraphicFramePr>
+          <p:cNvPr id="12" name="Table 11"/>
+          <p:cNvGraphicFramePr>
+            <a:graphicFrameLocks noGrp="1"/>
+          </p:cNvGraphicFramePr>
+          <p:nvPr>
+            <p:extLst>
+              <p:ext uri="{D42A27DB-BD31-4B8C-83A1-F6EECF244321}">
+                <p14:modId xmlns:p14="http://schemas.microsoft.com/office/powerpoint/2010/main" val="1310728419"/>
+              </p:ext>
+            </p:extLst>
+          </p:nvPr>
+        </p:nvGraphicFramePr>
+        <p:xfrm>
+          <a:off x="4586336" y="2352460"/>
+          <a:ext cx="758313" cy="1524000"/>
+        </p:xfrm>
+        <a:graphic>
+          <a:graphicData uri="http://schemas.openxmlformats.org/drawingml/2006/table">
+            <a:tbl>
+              <a:tblPr firstRow="1" bandRow="1">
+                <a:tableStyleId>{2D5ABB26-0587-4C30-8999-92F81FD0307C}</a:tableStyleId>
+              </a:tblPr>
+              <a:tblGrid>
+                <a:gridCol w="758313"/>
+              </a:tblGrid>
+              <a:tr h="240595">
+                <a:tc>
+                  <a:txBody>
+                    <a:bodyPr/>
+                    <a:lstStyle/>
+                    <a:p>
+                      <a:r>
+                        <a:rPr lang="en-US" sz="1400" dirty="0" err="1" smtClean="0">
+                          <a:solidFill>
+                            <a:schemeClr val="bg2">
+                              <a:lumMod val="10000"/>
+                            </a:schemeClr>
+                          </a:solidFill>
+                        </a:rPr>
+                        <a:t>Unaff</a:t>
+                      </a:r>
+                      <a:endParaRPr lang="en-US" sz="1400" dirty="0">
+                        <a:solidFill>
+                          <a:schemeClr val="bg2">
+                            <a:lumMod val="10000"/>
+                          </a:schemeClr>
+                        </a:solidFill>
+                      </a:endParaRPr>
+                    </a:p>
+                  </a:txBody>
+                  <a:tcPr/>
+                </a:tc>
+              </a:tr>
+              <a:tr h="240595">
+                <a:tc>
+                  <a:txBody>
+                    <a:bodyPr/>
+                    <a:lstStyle/>
+                    <a:p>
+                      <a:r>
+                        <a:rPr lang="en-US" sz="1400" dirty="0" err="1" smtClean="0">
+                          <a:solidFill>
+                            <a:schemeClr val="bg2">
+                              <a:lumMod val="10000"/>
+                            </a:schemeClr>
+                          </a:solidFill>
+                        </a:rPr>
+                        <a:t>Aff</a:t>
+                      </a:r>
+                      <a:endParaRPr lang="en-US" sz="1400" dirty="0">
+                        <a:solidFill>
+                          <a:schemeClr val="bg2">
+                            <a:lumMod val="10000"/>
+                          </a:schemeClr>
+                        </a:solidFill>
+                      </a:endParaRPr>
+                    </a:p>
+                  </a:txBody>
+                  <a:tcPr/>
+                </a:tc>
+              </a:tr>
+              <a:tr h="240595">
+                <a:tc>
+                  <a:txBody>
+                    <a:bodyPr/>
+                    <a:lstStyle/>
+                    <a:p>
+                      <a:r>
+                        <a:rPr lang="en-US" sz="1400" dirty="0" err="1" smtClean="0">
+                          <a:solidFill>
+                            <a:schemeClr val="bg2">
+                              <a:lumMod val="10000"/>
+                            </a:schemeClr>
+                          </a:solidFill>
+                        </a:rPr>
+                        <a:t>Unaff</a:t>
+                      </a:r>
+                      <a:endParaRPr lang="en-US" sz="1400" dirty="0" smtClean="0">
+                        <a:solidFill>
+                          <a:schemeClr val="bg2">
+                            <a:lumMod val="10000"/>
+                          </a:schemeClr>
+                        </a:solidFill>
+                      </a:endParaRPr>
+                    </a:p>
+                  </a:txBody>
+                  <a:tcPr/>
+                </a:tc>
+              </a:tr>
+              <a:tr h="240595">
+                <a:tc>
+                  <a:txBody>
+                    <a:bodyPr/>
+                    <a:lstStyle/>
+                    <a:p>
+                      <a:r>
+                        <a:rPr lang="en-US" sz="1400" dirty="0" err="1" smtClean="0">
+                          <a:solidFill>
+                            <a:schemeClr val="bg2">
+                              <a:lumMod val="10000"/>
+                            </a:schemeClr>
+                          </a:solidFill>
+                        </a:rPr>
+                        <a:t>Aff</a:t>
+                      </a:r>
+                      <a:endParaRPr lang="en-US" sz="1400" dirty="0">
+                        <a:solidFill>
+                          <a:schemeClr val="bg2">
+                            <a:lumMod val="10000"/>
+                          </a:schemeClr>
+                        </a:solidFill>
+                      </a:endParaRPr>
+                    </a:p>
+                  </a:txBody>
+                  <a:tcPr/>
+                </a:tc>
+              </a:tr>
+              <a:tr h="240595">
+                <a:tc>
+                  <a:txBody>
+                    <a:bodyPr/>
+                    <a:lstStyle/>
+                    <a:p>
+                      <a:r>
+                        <a:rPr lang="en-US" sz="1400" dirty="0" err="1" smtClean="0">
+                          <a:solidFill>
+                            <a:schemeClr val="bg2">
+                              <a:lumMod val="10000"/>
+                            </a:schemeClr>
+                          </a:solidFill>
+                        </a:rPr>
+                        <a:t>Unaff</a:t>
+                      </a:r>
+                      <a:endParaRPr lang="en-US" sz="1400" dirty="0">
+                        <a:solidFill>
+                          <a:schemeClr val="bg2">
+                            <a:lumMod val="10000"/>
+                          </a:schemeClr>
+                        </a:solidFill>
+                      </a:endParaRPr>
+                    </a:p>
+                  </a:txBody>
+                  <a:tcPr/>
+                </a:tc>
+              </a:tr>
+            </a:tbl>
+          </a:graphicData>
+        </a:graphic>
+      </p:graphicFrame>
+      <p:graphicFrame>
+        <p:nvGraphicFramePr>
+          <p:cNvPr id="16" name="Table 15"/>
+          <p:cNvGraphicFramePr>
+            <a:graphicFrameLocks noGrp="1"/>
+          </p:cNvGraphicFramePr>
+          <p:nvPr>
+            <p:extLst>
+              <p:ext uri="{D42A27DB-BD31-4B8C-83A1-F6EECF244321}">
+                <p14:modId xmlns:p14="http://schemas.microsoft.com/office/powerpoint/2010/main" val="918614747"/>
+              </p:ext>
+            </p:extLst>
+          </p:nvPr>
+        </p:nvGraphicFramePr>
+        <p:xfrm>
+          <a:off x="6413365" y="2349659"/>
+          <a:ext cx="712767" cy="1524000"/>
+        </p:xfrm>
+        <a:graphic>
+          <a:graphicData uri="http://schemas.openxmlformats.org/drawingml/2006/table">
+            <a:tbl>
+              <a:tblPr firstRow="1" bandRow="1">
+                <a:tableStyleId>{2D5ABB26-0587-4C30-8999-92F81FD0307C}</a:tableStyleId>
+              </a:tblPr>
+              <a:tblGrid>
+                <a:gridCol w="712767"/>
+              </a:tblGrid>
+              <a:tr h="150603">
+                <a:tc>
+                  <a:txBody>
+                    <a:bodyPr/>
+                    <a:lstStyle/>
+                    <a:p>
+                      <a:r>
+                        <a:rPr lang="en-US" sz="1400" dirty="0" smtClean="0">
+                          <a:solidFill>
+                            <a:schemeClr val="bg2">
+                              <a:lumMod val="10000"/>
+                            </a:schemeClr>
+                          </a:solidFill>
+                        </a:rPr>
+                        <a:t>g</a:t>
+                      </a:r>
+                      <a:r>
+                        <a:rPr lang="en-US" sz="1400" baseline="-25000" dirty="0" smtClean="0">
+                          <a:solidFill>
+                            <a:schemeClr val="bg2">
+                              <a:lumMod val="10000"/>
+                            </a:schemeClr>
+                          </a:solidFill>
+                        </a:rPr>
+                        <a:t>1</a:t>
+                      </a:r>
+                      <a:r>
+                        <a:rPr lang="en-US" sz="1400" dirty="0" smtClean="0">
+                          <a:solidFill>
+                            <a:schemeClr val="bg2">
+                              <a:lumMod val="10000"/>
+                            </a:schemeClr>
+                          </a:solidFill>
+                        </a:rPr>
+                        <a:t>|g</a:t>
+                      </a:r>
+                      <a:r>
+                        <a:rPr lang="en-US" sz="1400" baseline="-25000" dirty="0" smtClean="0">
+                          <a:solidFill>
+                            <a:schemeClr val="bg2">
+                              <a:lumMod val="10000"/>
+                            </a:schemeClr>
+                          </a:solidFill>
+                        </a:rPr>
+                        <a:t>1</a:t>
+                      </a:r>
+                      <a:endParaRPr lang="en-US" sz="1400" baseline="-25000" dirty="0">
+                        <a:solidFill>
+                          <a:schemeClr val="bg2">
+                            <a:lumMod val="10000"/>
+                          </a:schemeClr>
+                        </a:solidFill>
+                      </a:endParaRPr>
+                    </a:p>
+                  </a:txBody>
+                  <a:tcPr/>
+                </a:tc>
+              </a:tr>
+              <a:tr h="150603">
+                <a:tc>
+                  <a:txBody>
+                    <a:bodyPr/>
+                    <a:lstStyle/>
+                    <a:p>
+                      <a:r>
+                        <a:rPr lang="en-US" sz="1400" baseline="0" dirty="0" smtClean="0">
+                          <a:solidFill>
+                            <a:schemeClr val="bg2">
+                              <a:lumMod val="10000"/>
+                            </a:schemeClr>
+                          </a:solidFill>
+                        </a:rPr>
+                        <a:t>g</a:t>
+                      </a:r>
+                      <a:r>
+                        <a:rPr lang="en-US" sz="1400" baseline="-25000" dirty="0" smtClean="0">
+                          <a:solidFill>
+                            <a:schemeClr val="bg2">
+                              <a:lumMod val="10000"/>
+                            </a:schemeClr>
+                          </a:solidFill>
+                        </a:rPr>
+                        <a:t>1</a:t>
+                      </a:r>
+                      <a:r>
+                        <a:rPr lang="en-US" sz="1400" dirty="0" smtClean="0">
+                          <a:solidFill>
+                            <a:schemeClr val="bg2">
+                              <a:lumMod val="10000"/>
+                            </a:schemeClr>
+                          </a:solidFill>
+                        </a:rPr>
+                        <a:t>|g</a:t>
+                      </a:r>
+                      <a:r>
+                        <a:rPr lang="en-US" sz="1400" baseline="-25000" dirty="0" smtClean="0">
+                          <a:solidFill>
+                            <a:schemeClr val="bg2">
+                              <a:lumMod val="10000"/>
+                            </a:schemeClr>
+                          </a:solidFill>
+                        </a:rPr>
+                        <a:t>2</a:t>
+                      </a:r>
+                      <a:endParaRPr lang="en-US" sz="1400" baseline="-25000" dirty="0">
+                        <a:solidFill>
+                          <a:schemeClr val="bg2">
+                            <a:lumMod val="10000"/>
+                          </a:schemeClr>
+                        </a:solidFill>
+                      </a:endParaRPr>
+                    </a:p>
+                  </a:txBody>
+                  <a:tcPr/>
+                </a:tc>
+              </a:tr>
+              <a:tr h="150603">
+                <a:tc>
+                  <a:txBody>
+                    <a:bodyPr/>
+                    <a:lstStyle/>
+                    <a:p>
+                      <a:r>
+                        <a:rPr lang="en-US" sz="1400" baseline="0" dirty="0" smtClean="0">
+                          <a:solidFill>
+                            <a:schemeClr val="bg2">
+                              <a:lumMod val="10000"/>
+                            </a:schemeClr>
+                          </a:solidFill>
+                        </a:rPr>
+                        <a:t>g</a:t>
+                      </a:r>
+                      <a:r>
+                        <a:rPr lang="en-US" sz="1400" baseline="-25000" dirty="0" smtClean="0">
+                          <a:solidFill>
+                            <a:schemeClr val="bg2">
+                              <a:lumMod val="10000"/>
+                            </a:schemeClr>
+                          </a:solidFill>
+                        </a:rPr>
+                        <a:t>3</a:t>
+                      </a:r>
+                      <a:r>
+                        <a:rPr lang="en-US" sz="1400" dirty="0" smtClean="0">
+                          <a:solidFill>
+                            <a:schemeClr val="bg2">
+                              <a:lumMod val="10000"/>
+                            </a:schemeClr>
+                          </a:solidFill>
+                        </a:rPr>
+                        <a:t>|g</a:t>
+                      </a:r>
+                      <a:r>
+                        <a:rPr lang="en-US" sz="1400" baseline="-25000" dirty="0" smtClean="0">
+                          <a:solidFill>
+                            <a:schemeClr val="bg2">
+                              <a:lumMod val="10000"/>
+                            </a:schemeClr>
+                          </a:solidFill>
+                        </a:rPr>
+                        <a:t>4</a:t>
+                      </a:r>
+                      <a:endParaRPr lang="en-US" sz="1400" baseline="-25000" dirty="0" smtClean="0">
+                        <a:solidFill>
+                          <a:schemeClr val="bg2">
+                            <a:lumMod val="10000"/>
+                          </a:schemeClr>
+                        </a:solidFill>
+                      </a:endParaRPr>
+                    </a:p>
+                  </a:txBody>
+                  <a:tcPr/>
+                </a:tc>
+              </a:tr>
+              <a:tr h="150603">
+                <a:tc>
+                  <a:txBody>
+                    <a:bodyPr/>
+                    <a:lstStyle/>
+                    <a:p>
+                      <a:r>
+                        <a:rPr lang="en-US" sz="1400" baseline="0" dirty="0" smtClean="0">
+                          <a:solidFill>
+                            <a:schemeClr val="bg2">
+                              <a:lumMod val="10000"/>
+                            </a:schemeClr>
+                          </a:solidFill>
+                        </a:rPr>
+                        <a:t>g</a:t>
+                      </a:r>
+                      <a:r>
+                        <a:rPr lang="en-US" sz="1400" baseline="-25000" dirty="0" smtClean="0">
+                          <a:solidFill>
+                            <a:schemeClr val="bg2">
+                              <a:lumMod val="10000"/>
+                            </a:schemeClr>
+                          </a:solidFill>
+                        </a:rPr>
+                        <a:t>2</a:t>
+                      </a:r>
+                      <a:r>
+                        <a:rPr lang="en-US" sz="1400" dirty="0" smtClean="0">
+                          <a:solidFill>
+                            <a:schemeClr val="bg2">
+                              <a:lumMod val="10000"/>
+                            </a:schemeClr>
+                          </a:solidFill>
+                        </a:rPr>
+                        <a:t>|g</a:t>
+                      </a:r>
+                      <a:r>
+                        <a:rPr lang="en-US" sz="1400" baseline="-25000" dirty="0" smtClean="0">
+                          <a:solidFill>
+                            <a:schemeClr val="bg2">
+                              <a:lumMod val="10000"/>
+                            </a:schemeClr>
+                          </a:solidFill>
+                        </a:rPr>
+                        <a:t>2</a:t>
+                      </a:r>
+                      <a:endParaRPr lang="en-US" sz="1400" baseline="-25000" dirty="0">
+                        <a:solidFill>
+                          <a:schemeClr val="bg2">
+                            <a:lumMod val="10000"/>
+                          </a:schemeClr>
+                        </a:solidFill>
+                      </a:endParaRPr>
+                    </a:p>
+                  </a:txBody>
+                  <a:tcPr/>
+                </a:tc>
+              </a:tr>
+              <a:tr h="150603">
+                <a:tc>
+                  <a:txBody>
+                    <a:bodyPr/>
+                    <a:lstStyle/>
+                    <a:p>
+                      <a:r>
+                        <a:rPr lang="en-US" sz="1400" baseline="0" dirty="0" smtClean="0">
+                          <a:solidFill>
+                            <a:schemeClr val="bg2">
+                              <a:lumMod val="10000"/>
+                            </a:schemeClr>
+                          </a:solidFill>
+                        </a:rPr>
+                        <a:t>g</a:t>
+                      </a:r>
+                      <a:r>
+                        <a:rPr lang="en-US" sz="1400" baseline="-25000" dirty="0" smtClean="0">
+                          <a:solidFill>
+                            <a:schemeClr val="bg2">
+                              <a:lumMod val="10000"/>
+                            </a:schemeClr>
+                          </a:solidFill>
+                        </a:rPr>
+                        <a:t>4</a:t>
+                      </a:r>
+                      <a:r>
+                        <a:rPr lang="en-US" sz="1400" dirty="0" smtClean="0">
+                          <a:solidFill>
+                            <a:schemeClr val="bg2">
+                              <a:lumMod val="10000"/>
+                            </a:schemeClr>
+                          </a:solidFill>
+                        </a:rPr>
+                        <a:t>|g</a:t>
+                      </a:r>
+                      <a:r>
+                        <a:rPr lang="en-US" sz="1400" baseline="-25000" dirty="0" smtClean="0">
+                          <a:solidFill>
+                            <a:schemeClr val="bg2">
+                              <a:lumMod val="10000"/>
+                            </a:schemeClr>
+                          </a:solidFill>
+                        </a:rPr>
+                        <a:t>4</a:t>
+                      </a:r>
+                      <a:endParaRPr lang="en-US" sz="1400" baseline="-25000" dirty="0">
+                        <a:solidFill>
+                          <a:schemeClr val="bg2">
+                            <a:lumMod val="10000"/>
+                          </a:schemeClr>
+                        </a:solidFill>
+                      </a:endParaRPr>
+                    </a:p>
+                  </a:txBody>
+                  <a:tcPr/>
+                </a:tc>
+              </a:tr>
+            </a:tbl>
+          </a:graphicData>
+        </a:graphic>
+      </p:graphicFrame>
+      <p:sp>
+        <p:nvSpPr>
+          <p:cNvPr id="17" name="TextBox 16"/>
+          <p:cNvSpPr txBox="1"/>
+          <p:nvPr/>
+        </p:nvSpPr>
+        <p:spPr>
+          <a:xfrm>
+            <a:off x="1225147" y="171042"/>
+            <a:ext cx="1608133" cy="523220"/>
+          </a:xfrm>
+          <a:prstGeom prst="rect">
+            <a:avLst/>
+          </a:prstGeom>
+          <a:noFill/>
+        </p:spPr>
+        <p:txBody>
+          <a:bodyPr wrap="none" rtlCol="0">
+            <a:spAutoFit/>
+          </a:bodyPr>
+          <a:lstStyle/>
+          <a:p>
+            <a:r>
+              <a:rPr lang="en-US" sz="2800" dirty="0" smtClean="0">
+                <a:solidFill>
+                  <a:srgbClr val="FFC000"/>
+                </a:solidFill>
+              </a:rPr>
+              <a:t>Scenario </a:t>
+            </a:r>
+            <a:r>
+              <a:rPr lang="en-US" sz="2800" dirty="0">
+                <a:solidFill>
+                  <a:srgbClr val="FFC000"/>
+                </a:solidFill>
+              </a:rPr>
+              <a:t>I</a:t>
+            </a:r>
+            <a:endParaRPr lang="en-US" sz="2800" dirty="0">
+              <a:solidFill>
+                <a:srgbClr val="FFC000"/>
+              </a:solidFill>
+            </a:endParaRPr>
+          </a:p>
+        </p:txBody>
+      </p:sp>
+      <p:sp>
+        <p:nvSpPr>
+          <p:cNvPr id="18" name="TextBox 17"/>
+          <p:cNvSpPr txBox="1"/>
+          <p:nvPr/>
+        </p:nvSpPr>
+        <p:spPr>
+          <a:xfrm>
+            <a:off x="339002" y="732144"/>
+            <a:ext cx="3641510" cy="923330"/>
+          </a:xfrm>
+          <a:prstGeom prst="rect">
+            <a:avLst/>
+          </a:prstGeom>
+          <a:noFill/>
+        </p:spPr>
+        <p:txBody>
+          <a:bodyPr wrap="none" rtlCol="0">
+            <a:spAutoFit/>
+          </a:bodyPr>
+          <a:lstStyle/>
+          <a:p>
+            <a:r>
+              <a:rPr lang="en-US" dirty="0" smtClean="0">
+                <a:solidFill>
+                  <a:schemeClr val="bg1"/>
+                </a:solidFill>
+              </a:rPr>
+              <a:t>Penetrance </a:t>
+            </a:r>
+            <a:r>
+              <a:rPr lang="en-US" dirty="0" smtClean="0">
+                <a:solidFill>
+                  <a:schemeClr val="bg1"/>
+                </a:solidFill>
+              </a:rPr>
+              <a:t>model - the</a:t>
+            </a:r>
+            <a:r>
+              <a:rPr lang="en-US" dirty="0">
+                <a:solidFill>
+                  <a:schemeClr val="bg1"/>
+                </a:solidFill>
+              </a:rPr>
+              <a:t> </a:t>
+            </a:r>
+            <a:r>
+              <a:rPr lang="en-US" dirty="0" smtClean="0">
+                <a:solidFill>
+                  <a:schemeClr val="bg1"/>
+                </a:solidFill>
+              </a:rPr>
+              <a:t>probabilistic </a:t>
+            </a:r>
+          </a:p>
+          <a:p>
+            <a:r>
+              <a:rPr lang="en-US" dirty="0" smtClean="0">
+                <a:solidFill>
+                  <a:schemeClr val="bg1"/>
+                </a:solidFill>
+              </a:rPr>
+              <a:t>relationship between trait and QTL </a:t>
+            </a:r>
+          </a:p>
+          <a:p>
+            <a:r>
+              <a:rPr lang="en-US" dirty="0" smtClean="0">
+                <a:solidFill>
+                  <a:schemeClr val="bg1"/>
+                </a:solidFill>
+              </a:rPr>
+              <a:t>genotype</a:t>
+            </a:r>
+            <a:endParaRPr lang="en-US" dirty="0">
+              <a:solidFill>
+                <a:schemeClr val="bg1"/>
+              </a:solidFill>
+            </a:endParaRPr>
+          </a:p>
+        </p:txBody>
+      </p:sp>
+      <p:graphicFrame>
+        <p:nvGraphicFramePr>
+          <p:cNvPr id="19" name="Table 18"/>
+          <p:cNvGraphicFramePr>
+            <a:graphicFrameLocks noGrp="1"/>
+          </p:cNvGraphicFramePr>
+          <p:nvPr>
+            <p:extLst>
+              <p:ext uri="{D42A27DB-BD31-4B8C-83A1-F6EECF244321}">
+                <p14:modId xmlns:p14="http://schemas.microsoft.com/office/powerpoint/2010/main" val="720187506"/>
+              </p:ext>
+            </p:extLst>
+          </p:nvPr>
+        </p:nvGraphicFramePr>
+        <p:xfrm>
+          <a:off x="339002" y="1753861"/>
+          <a:ext cx="3550592" cy="1854200"/>
+        </p:xfrm>
+        <a:graphic>
+          <a:graphicData uri="http://schemas.openxmlformats.org/drawingml/2006/table">
+            <a:tbl>
+              <a:tblPr firstRow="1" bandRow="1">
+                <a:tableStyleId>{22838BEF-8BB2-4498-84A7-C5851F593DF1}</a:tableStyleId>
+              </a:tblPr>
+              <a:tblGrid>
+                <a:gridCol w="1325854"/>
+                <a:gridCol w="1114064"/>
+                <a:gridCol w="1110674"/>
+              </a:tblGrid>
+              <a:tr h="370840">
+                <a:tc rowSpan="2">
+                  <a:txBody>
+                    <a:bodyPr/>
+                    <a:lstStyle/>
+                    <a:p>
+                      <a:r>
+                        <a:rPr lang="en-US" dirty="0" smtClean="0"/>
+                        <a:t>QTL Genotype</a:t>
+                      </a:r>
+                      <a:endParaRPr lang="en-US" dirty="0"/>
+                    </a:p>
+                  </a:txBody>
+                  <a:tcPr/>
+                </a:tc>
+                <a:tc gridSpan="2">
+                  <a:txBody>
+                    <a:bodyPr/>
+                    <a:lstStyle/>
+                    <a:p>
+                      <a:pPr algn="ctr"/>
+                      <a:r>
+                        <a:rPr lang="en-US" dirty="0" smtClean="0"/>
+                        <a:t>Trait</a:t>
+                      </a:r>
+                      <a:endParaRPr lang="en-US" dirty="0"/>
+                    </a:p>
+                  </a:txBody>
+                  <a:tcPr/>
+                </a:tc>
+                <a:tc hMerge="1">
+                  <a:txBody>
+                    <a:bodyPr/>
+                    <a:lstStyle/>
+                    <a:p>
+                      <a:endParaRPr lang="en-US" dirty="0"/>
+                    </a:p>
+                  </a:txBody>
+                  <a:tcPr/>
+                </a:tc>
+              </a:tr>
+              <a:tr h="370840">
+                <a:tc vMerge="1">
+                  <a:txBody>
+                    <a:bodyPr/>
+                    <a:lstStyle/>
+                    <a:p>
+                      <a:endParaRPr lang="en-US" dirty="0"/>
+                    </a:p>
+                  </a:txBody>
+                  <a:tcPr/>
+                </a:tc>
+                <a:tc>
+                  <a:txBody>
+                    <a:bodyPr/>
+                    <a:lstStyle/>
+                    <a:p>
+                      <a:pPr algn="ctr"/>
+                      <a:r>
+                        <a:rPr lang="en-US" b="1" dirty="0" err="1" smtClean="0"/>
+                        <a:t>Aff</a:t>
+                      </a:r>
+                      <a:endParaRPr lang="en-US" b="1" dirty="0"/>
+                    </a:p>
+                  </a:txBody>
+                  <a:tcPr/>
+                </a:tc>
+                <a:tc>
+                  <a:txBody>
+                    <a:bodyPr/>
+                    <a:lstStyle/>
+                    <a:p>
+                      <a:pPr algn="ctr"/>
+                      <a:r>
+                        <a:rPr lang="en-US" b="1" dirty="0" err="1" smtClean="0"/>
+                        <a:t>Unaff</a:t>
+                      </a:r>
+                      <a:endParaRPr lang="en-US" b="1" dirty="0"/>
+                    </a:p>
+                  </a:txBody>
+                  <a:tcPr/>
+                </a:tc>
+              </a:tr>
+              <a:tr h="370840">
+                <a:tc>
+                  <a:txBody>
+                    <a:bodyPr/>
+                    <a:lstStyle/>
+                    <a:p>
+                      <a:r>
+                        <a:rPr lang="en-US" dirty="0" smtClean="0"/>
+                        <a:t>QQ</a:t>
+                      </a:r>
+                      <a:endParaRPr lang="en-US" dirty="0"/>
+                    </a:p>
+                  </a:txBody>
+                  <a:tcPr/>
+                </a:tc>
+                <a:tc>
+                  <a:txBody>
+                    <a:bodyPr/>
+                    <a:lstStyle/>
+                    <a:p>
+                      <a:pPr algn="ctr"/>
+                      <a:r>
+                        <a:rPr lang="en-US" dirty="0" smtClean="0"/>
+                        <a:t>1.0</a:t>
+                      </a:r>
+                      <a:endParaRPr lang="en-US" dirty="0"/>
+                    </a:p>
+                  </a:txBody>
+                  <a:tcPr/>
+                </a:tc>
+                <a:tc>
+                  <a:txBody>
+                    <a:bodyPr/>
+                    <a:lstStyle/>
+                    <a:p>
+                      <a:pPr algn="ctr"/>
+                      <a:r>
+                        <a:rPr lang="en-US" dirty="0" smtClean="0"/>
+                        <a:t>0.0</a:t>
+                      </a:r>
+                      <a:endParaRPr lang="en-US" dirty="0"/>
+                    </a:p>
+                  </a:txBody>
+                  <a:tcPr/>
+                </a:tc>
+              </a:tr>
+              <a:tr h="370840">
+                <a:tc>
+                  <a:txBody>
+                    <a:bodyPr/>
+                    <a:lstStyle/>
+                    <a:p>
+                      <a:r>
+                        <a:rPr lang="en-US" dirty="0" err="1" smtClean="0"/>
+                        <a:t>Qq</a:t>
+                      </a:r>
+                      <a:endParaRPr lang="en-US" dirty="0"/>
+                    </a:p>
+                  </a:txBody>
+                  <a:tcPr/>
+                </a:tc>
+                <a:tc>
+                  <a:txBody>
+                    <a:bodyPr/>
+                    <a:lstStyle/>
+                    <a:p>
+                      <a:pPr algn="ctr"/>
+                      <a:r>
+                        <a:rPr lang="en-US" dirty="0" smtClean="0"/>
+                        <a:t>1.0</a:t>
+                      </a:r>
+                      <a:endParaRPr lang="en-US" dirty="0"/>
+                    </a:p>
+                  </a:txBody>
+                  <a:tcPr/>
+                </a:tc>
+                <a:tc>
+                  <a:txBody>
+                    <a:bodyPr/>
+                    <a:lstStyle/>
+                    <a:p>
+                      <a:pPr algn="ctr"/>
+                      <a:r>
+                        <a:rPr lang="en-US" dirty="0" smtClean="0"/>
+                        <a:t>0.0</a:t>
+                      </a:r>
+                      <a:endParaRPr lang="en-US" dirty="0"/>
+                    </a:p>
+                  </a:txBody>
+                  <a:tcPr/>
+                </a:tc>
+              </a:tr>
+              <a:tr h="370840">
+                <a:tc>
+                  <a:txBody>
+                    <a:bodyPr/>
+                    <a:lstStyle/>
+                    <a:p>
+                      <a:r>
+                        <a:rPr lang="en-US" dirty="0" err="1" smtClean="0"/>
+                        <a:t>qq</a:t>
+                      </a:r>
+                      <a:endParaRPr lang="en-US" dirty="0"/>
+                    </a:p>
+                  </a:txBody>
+                  <a:tcPr/>
+                </a:tc>
+                <a:tc>
+                  <a:txBody>
+                    <a:bodyPr/>
+                    <a:lstStyle/>
+                    <a:p>
+                      <a:pPr algn="ctr"/>
+                      <a:r>
+                        <a:rPr lang="en-US" dirty="0" smtClean="0"/>
+                        <a:t>0.0</a:t>
+                      </a:r>
+                      <a:endParaRPr lang="en-US" dirty="0"/>
+                    </a:p>
+                  </a:txBody>
+                  <a:tcPr/>
+                </a:tc>
+                <a:tc>
+                  <a:txBody>
+                    <a:bodyPr/>
+                    <a:lstStyle/>
+                    <a:p>
+                      <a:pPr algn="ctr"/>
+                      <a:r>
+                        <a:rPr lang="en-US" dirty="0" smtClean="0"/>
+                        <a:t>1.0</a:t>
+                      </a:r>
+                      <a:endParaRPr lang="en-US" dirty="0"/>
+                    </a:p>
+                  </a:txBody>
+                  <a:tcPr/>
+                </a:tc>
+              </a:tr>
+            </a:tbl>
+          </a:graphicData>
+        </a:graphic>
+      </p:graphicFrame>
+      <p:sp>
+        <p:nvSpPr>
+          <p:cNvPr id="28" name="TextBox 27"/>
+          <p:cNvSpPr txBox="1"/>
+          <p:nvPr/>
+        </p:nvSpPr>
+        <p:spPr>
+          <a:xfrm>
+            <a:off x="420652" y="3698388"/>
+            <a:ext cx="3633967" cy="830997"/>
+          </a:xfrm>
+          <a:prstGeom prst="rect">
+            <a:avLst/>
+          </a:prstGeom>
+          <a:noFill/>
+        </p:spPr>
+        <p:txBody>
+          <a:bodyPr wrap="square" rtlCol="0">
+            <a:spAutoFit/>
+          </a:bodyPr>
+          <a:lstStyle/>
+          <a:p>
+            <a:r>
+              <a:rPr lang="en-US" sz="1600" dirty="0" smtClean="0">
+                <a:solidFill>
+                  <a:schemeClr val="bg1"/>
+                </a:solidFill>
+              </a:rPr>
+              <a:t>Allowable QTL alleles </a:t>
+            </a:r>
+            <a:r>
+              <a:rPr lang="en-US" sz="1600" dirty="0" smtClean="0">
+                <a:solidFill>
+                  <a:schemeClr val="bg1"/>
+                </a:solidFill>
+              </a:rPr>
+              <a:t>consistent </a:t>
+            </a:r>
+            <a:r>
+              <a:rPr lang="en-US" sz="1600" dirty="0" smtClean="0">
+                <a:solidFill>
+                  <a:schemeClr val="bg1"/>
+                </a:solidFill>
+              </a:rPr>
+              <a:t>w</a:t>
+            </a:r>
+            <a:r>
+              <a:rPr lang="en-US" sz="1600" dirty="0" smtClean="0">
+                <a:solidFill>
+                  <a:schemeClr val="bg1"/>
+                </a:solidFill>
+              </a:rPr>
+              <a:t>ith observed disease status,  phased marker genotypes </a:t>
+            </a:r>
+            <a:r>
+              <a:rPr lang="en-US" sz="1600" dirty="0" smtClean="0">
+                <a:solidFill>
+                  <a:schemeClr val="bg1"/>
+                </a:solidFill>
+              </a:rPr>
+              <a:t>and </a:t>
+            </a:r>
+            <a:r>
+              <a:rPr lang="en-US" sz="1600" dirty="0" smtClean="0">
+                <a:solidFill>
+                  <a:schemeClr val="bg1"/>
+                </a:solidFill>
+              </a:rPr>
+              <a:t>penetrance </a:t>
+            </a:r>
+            <a:r>
+              <a:rPr lang="en-US" sz="1600" dirty="0" smtClean="0">
+                <a:solidFill>
+                  <a:schemeClr val="bg1"/>
+                </a:solidFill>
+              </a:rPr>
+              <a:t>model</a:t>
+            </a:r>
+            <a:endParaRPr lang="en-US" sz="1600" dirty="0">
+              <a:solidFill>
+                <a:schemeClr val="bg1"/>
+              </a:solidFill>
+            </a:endParaRPr>
+          </a:p>
+        </p:txBody>
+      </p:sp>
+      <p:graphicFrame>
+        <p:nvGraphicFramePr>
+          <p:cNvPr id="29" name="Table 28"/>
+          <p:cNvGraphicFramePr>
+            <a:graphicFrameLocks noGrp="1"/>
+          </p:cNvGraphicFramePr>
+          <p:nvPr>
+            <p:extLst>
+              <p:ext uri="{D42A27DB-BD31-4B8C-83A1-F6EECF244321}">
+                <p14:modId xmlns:p14="http://schemas.microsoft.com/office/powerpoint/2010/main" val="483349280"/>
+              </p:ext>
+            </p:extLst>
+          </p:nvPr>
+        </p:nvGraphicFramePr>
+        <p:xfrm>
+          <a:off x="381533" y="4531740"/>
+          <a:ext cx="3537404" cy="2062480"/>
+        </p:xfrm>
+        <a:graphic>
+          <a:graphicData uri="http://schemas.openxmlformats.org/drawingml/2006/table">
+            <a:tbl>
+              <a:tblPr firstRow="1" bandRow="1">
+                <a:tableStyleId>{EB9631B5-78F2-41C9-869B-9F39066F8104}</a:tableStyleId>
+              </a:tblPr>
+              <a:tblGrid>
+                <a:gridCol w="1253870"/>
+                <a:gridCol w="1063886"/>
+                <a:gridCol w="1219648"/>
+              </a:tblGrid>
+              <a:tr h="370840">
+                <a:tc>
+                  <a:txBody>
+                    <a:bodyPr/>
+                    <a:lstStyle/>
+                    <a:p>
+                      <a:r>
+                        <a:rPr lang="en-US" sz="1600" dirty="0" smtClean="0"/>
+                        <a:t>Marker</a:t>
+                      </a:r>
+                      <a:r>
+                        <a:rPr lang="en-US" sz="1600" baseline="0" dirty="0" smtClean="0"/>
+                        <a:t> </a:t>
+                      </a:r>
+                    </a:p>
+                    <a:p>
+                      <a:r>
+                        <a:rPr lang="en-US" sz="1600" baseline="0" dirty="0" smtClean="0"/>
+                        <a:t>Haplotype</a:t>
+                      </a:r>
+                      <a:endParaRPr lang="en-US" sz="1600" dirty="0"/>
+                    </a:p>
+                  </a:txBody>
+                  <a:tcPr>
+                    <a:lnT w="28575" cap="flat" cmpd="sng" algn="ctr">
+                      <a:noFill/>
+                      <a:prstDash val="solid"/>
+                      <a:round/>
+                      <a:headEnd type="none" w="med" len="med"/>
+                      <a:tailEnd type="none" w="med" len="med"/>
+                    </a:lnT>
+                    <a:lnB w="12700" cap="flat" cmpd="sng" algn="ctr">
+                      <a:solidFill>
+                        <a:schemeClr val="tx1"/>
+                      </a:solidFill>
+                      <a:prstDash val="solid"/>
+                      <a:round/>
+                      <a:headEnd type="none" w="med" len="med"/>
+                      <a:tailEnd type="none" w="med" len="med"/>
+                    </a:lnB>
+                  </a:tcPr>
+                </a:tc>
+                <a:tc>
+                  <a:txBody>
+                    <a:bodyPr/>
+                    <a:lstStyle/>
+                    <a:p>
+                      <a:pPr algn="ctr"/>
+                      <a:r>
+                        <a:rPr lang="en-US" sz="1600" dirty="0" smtClean="0"/>
+                        <a:t>QTL </a:t>
+                      </a:r>
+                    </a:p>
+                    <a:p>
+                      <a:pPr algn="ctr"/>
+                      <a:r>
+                        <a:rPr lang="en-US" sz="1600" dirty="0" smtClean="0"/>
+                        <a:t>allele</a:t>
+                      </a:r>
+                      <a:endParaRPr lang="en-US" sz="1600" dirty="0"/>
+                    </a:p>
+                  </a:txBody>
+                  <a:tcPr>
+                    <a:lnT w="28575" cap="flat" cmpd="sng" algn="ctr">
+                      <a:noFill/>
+                      <a:prstDash val="solid"/>
+                      <a:round/>
+                      <a:headEnd type="none" w="med" len="med"/>
+                      <a:tailEnd type="none" w="med" len="med"/>
+                    </a:lnT>
+                    <a:lnB w="12700" cap="flat" cmpd="sng" algn="ctr">
+                      <a:solidFill>
+                        <a:schemeClr val="tx1"/>
+                      </a:solidFill>
+                      <a:prstDash val="solid"/>
+                      <a:round/>
+                      <a:headEnd type="none" w="med" len="med"/>
+                      <a:tailEnd type="none" w="med" len="med"/>
+                    </a:lnB>
+                  </a:tcPr>
+                </a:tc>
+                <a:tc>
+                  <a:txBody>
+                    <a:bodyPr/>
+                    <a:lstStyle/>
+                    <a:p>
+                      <a:pPr algn="ctr"/>
+                      <a:r>
+                        <a:rPr lang="en-US" sz="1600" dirty="0" err="1" smtClean="0"/>
+                        <a:t>Pr</a:t>
+                      </a:r>
+                      <a:r>
+                        <a:rPr lang="en-US" sz="1600" dirty="0" smtClean="0"/>
+                        <a:t>(</a:t>
+                      </a:r>
+                      <a:r>
+                        <a:rPr lang="en-US" sz="1600" b="0" dirty="0" smtClean="0"/>
+                        <a:t>Q</a:t>
+                      </a:r>
+                      <a:r>
+                        <a:rPr lang="en-US" sz="1600" dirty="0" smtClean="0"/>
+                        <a:t>|Y,G, penetrance)</a:t>
+                      </a:r>
+                      <a:endParaRPr lang="en-US" sz="1600" dirty="0"/>
+                    </a:p>
+                  </a:txBody>
+                  <a:tcPr>
+                    <a:lnT w="28575" cap="flat" cmpd="sng" algn="ctr">
+                      <a:noFill/>
+                      <a:prstDash val="solid"/>
+                      <a:round/>
+                      <a:headEnd type="none" w="med" len="med"/>
+                      <a:tailEnd type="none" w="med" len="med"/>
+                    </a:lnT>
+                    <a:lnB w="12700" cap="flat" cmpd="sng" algn="ctr">
+                      <a:solidFill>
+                        <a:schemeClr val="tx1"/>
+                      </a:solidFill>
+                      <a:prstDash val="solid"/>
+                      <a:round/>
+                      <a:headEnd type="none" w="med" len="med"/>
+                      <a:tailEnd type="none" w="med" len="med"/>
+                    </a:lnB>
+                  </a:tcPr>
+                </a:tc>
+              </a:tr>
+              <a:tr h="370840">
+                <a:tc>
+                  <a:txBody>
+                    <a:bodyPr/>
+                    <a:lstStyle/>
+                    <a:p>
+                      <a:r>
+                        <a:rPr lang="en-US" dirty="0" smtClean="0"/>
+                        <a:t>g1</a:t>
+                      </a:r>
+                      <a:endParaRPr lang="en-US" dirty="0"/>
+                    </a:p>
+                  </a:txBody>
+                  <a:tcPr>
+                    <a:lnT w="12700" cap="flat" cmpd="sng" algn="ctr">
+                      <a:solidFill>
+                        <a:schemeClr val="tx1"/>
+                      </a:solidFill>
+                      <a:prstDash val="solid"/>
+                      <a:round/>
+                      <a:headEnd type="none" w="med" len="med"/>
+                      <a:tailEnd type="none" w="med" len="med"/>
+                    </a:lnT>
+                  </a:tcPr>
+                </a:tc>
+                <a:tc>
+                  <a:txBody>
+                    <a:bodyPr/>
+                    <a:lstStyle/>
+                    <a:p>
+                      <a:pPr algn="ctr"/>
+                      <a:r>
+                        <a:rPr lang="en-US" dirty="0" smtClean="0"/>
+                        <a:t>q</a:t>
+                      </a:r>
+                      <a:endParaRPr lang="en-US" dirty="0"/>
+                    </a:p>
+                  </a:txBody>
+                  <a:tcPr>
+                    <a:lnT w="12700" cap="flat" cmpd="sng" algn="ctr">
+                      <a:solidFill>
+                        <a:schemeClr val="tx1"/>
+                      </a:solidFill>
+                      <a:prstDash val="solid"/>
+                      <a:round/>
+                      <a:headEnd type="none" w="med" len="med"/>
+                      <a:tailEnd type="none" w="med" len="med"/>
+                    </a:lnT>
+                  </a:tcPr>
+                </a:tc>
+                <a:tc>
+                  <a:txBody>
+                    <a:bodyPr/>
+                    <a:lstStyle/>
+                    <a:p>
+                      <a:pPr algn="ctr"/>
+                      <a:r>
+                        <a:rPr lang="en-US" dirty="0" smtClean="0"/>
+                        <a:t>0.0</a:t>
+                      </a:r>
+                      <a:endParaRPr lang="en-US" dirty="0"/>
+                    </a:p>
+                  </a:txBody>
+                  <a:tcPr>
+                    <a:lnT w="12700" cap="flat" cmpd="sng" algn="ctr">
+                      <a:solidFill>
+                        <a:schemeClr val="tx1"/>
+                      </a:solidFill>
+                      <a:prstDash val="solid"/>
+                      <a:round/>
+                      <a:headEnd type="none" w="med" len="med"/>
+                      <a:tailEnd type="none" w="med" len="med"/>
+                    </a:lnT>
+                  </a:tcPr>
+                </a:tc>
+              </a:tr>
+              <a:tr h="370840">
+                <a:tc>
+                  <a:txBody>
+                    <a:bodyPr/>
+                    <a:lstStyle/>
+                    <a:p>
+                      <a:r>
+                        <a:rPr lang="en-US" dirty="0" smtClean="0"/>
+                        <a:t>g2</a:t>
+                      </a:r>
+                      <a:endParaRPr lang="en-US" dirty="0"/>
+                    </a:p>
+                  </a:txBody>
+                  <a:tcPr/>
+                </a:tc>
+                <a:tc>
+                  <a:txBody>
+                    <a:bodyPr/>
+                    <a:lstStyle/>
+                    <a:p>
+                      <a:pPr algn="ctr"/>
+                      <a:r>
+                        <a:rPr lang="en-US" dirty="0" smtClean="0"/>
+                        <a:t>Q</a:t>
+                      </a:r>
+                      <a:endParaRPr lang="en-US" dirty="0"/>
+                    </a:p>
+                  </a:txBody>
+                  <a:tcPr/>
+                </a:tc>
+                <a:tc>
+                  <a:txBody>
+                    <a:bodyPr/>
+                    <a:lstStyle/>
+                    <a:p>
+                      <a:pPr algn="ctr"/>
+                      <a:r>
+                        <a:rPr lang="en-US" dirty="0" smtClean="0"/>
+                        <a:t>1.0</a:t>
+                      </a:r>
+                      <a:endParaRPr lang="en-US" dirty="0"/>
+                    </a:p>
+                  </a:txBody>
+                  <a:tcPr/>
+                </a:tc>
+              </a:tr>
+              <a:tr h="370840">
+                <a:tc>
+                  <a:txBody>
+                    <a:bodyPr/>
+                    <a:lstStyle/>
+                    <a:p>
+                      <a:r>
+                        <a:rPr lang="en-US" dirty="0" smtClean="0"/>
+                        <a:t>g3</a:t>
+                      </a:r>
+                      <a:endParaRPr lang="en-US" dirty="0"/>
+                    </a:p>
+                  </a:txBody>
+                  <a:tcPr/>
+                </a:tc>
+                <a:tc>
+                  <a:txBody>
+                    <a:bodyPr/>
+                    <a:lstStyle/>
+                    <a:p>
+                      <a:pPr algn="ctr"/>
+                      <a:r>
+                        <a:rPr lang="en-US" dirty="0" smtClean="0"/>
+                        <a:t>q</a:t>
+                      </a:r>
+                      <a:endParaRPr lang="en-US" dirty="0"/>
+                    </a:p>
+                  </a:txBody>
+                  <a:tcPr/>
+                </a:tc>
+                <a:tc>
+                  <a:txBody>
+                    <a:bodyPr/>
+                    <a:lstStyle/>
+                    <a:p>
+                      <a:pPr algn="ctr"/>
+                      <a:r>
+                        <a:rPr lang="en-US" dirty="0" smtClean="0"/>
+                        <a:t>0.0</a:t>
+                      </a:r>
+                      <a:endParaRPr lang="en-US" dirty="0"/>
+                    </a:p>
+                  </a:txBody>
+                  <a:tcPr/>
+                </a:tc>
+              </a:tr>
+              <a:tr h="370840">
+                <a:tc>
+                  <a:txBody>
+                    <a:bodyPr/>
+                    <a:lstStyle/>
+                    <a:p>
+                      <a:r>
+                        <a:rPr lang="en-US" dirty="0" smtClean="0"/>
+                        <a:t>g4</a:t>
+                      </a:r>
+                      <a:endParaRPr lang="en-US" dirty="0"/>
+                    </a:p>
+                  </a:txBody>
+                  <a:tcPr/>
+                </a:tc>
+                <a:tc>
+                  <a:txBody>
+                    <a:bodyPr/>
+                    <a:lstStyle/>
+                    <a:p>
+                      <a:pPr algn="ctr"/>
+                      <a:r>
+                        <a:rPr lang="en-US" dirty="0" smtClean="0"/>
+                        <a:t>q</a:t>
+                      </a:r>
+                      <a:endParaRPr lang="en-US" dirty="0"/>
+                    </a:p>
+                  </a:txBody>
+                  <a:tcPr/>
+                </a:tc>
+                <a:tc>
+                  <a:txBody>
+                    <a:bodyPr/>
+                    <a:lstStyle/>
+                    <a:p>
+                      <a:pPr algn="ctr"/>
+                      <a:r>
+                        <a:rPr lang="en-US" dirty="0" smtClean="0"/>
+                        <a:t>0.0</a:t>
+                      </a:r>
+                      <a:endParaRPr lang="en-US" dirty="0"/>
+                    </a:p>
+                  </a:txBody>
+                  <a:tcPr/>
+                </a:tc>
+              </a:tr>
+            </a:tbl>
+          </a:graphicData>
+        </a:graphic>
+      </p:graphicFrame>
+      <p:sp>
+        <p:nvSpPr>
+          <p:cNvPr id="38" name="Bent Arrow 37"/>
+          <p:cNvSpPr/>
+          <p:nvPr/>
+        </p:nvSpPr>
+        <p:spPr>
+          <a:xfrm>
+            <a:off x="6443011" y="210791"/>
+            <a:ext cx="812959" cy="759865"/>
+          </a:xfrm>
+          <a:prstGeom prst="bentArrow">
+            <a:avLst/>
+          </a:prstGeom>
+          <a:solidFill>
+            <a:srgbClr val="FFC000"/>
+          </a:solidFill>
+          <a:ln>
+            <a:solidFill>
+              <a:srgbClr val="FFC000"/>
+            </a:solidFill>
+          </a:ln>
+        </p:spPr>
+        <p:style>
+          <a:lnRef idx="2">
+            <a:schemeClr val="accent1">
+              <a:shade val="50000"/>
+            </a:schemeClr>
+          </a:lnRef>
+          <a:fillRef idx="1">
+            <a:schemeClr val="accent1"/>
+          </a:fillRef>
+          <a:effectRef idx="0">
+            <a:schemeClr val="accent1"/>
+          </a:effectRef>
+          <a:fontRef idx="minor">
+            <a:schemeClr val="lt1"/>
+          </a:fontRef>
+        </p:style>
+        <p:txBody>
+          <a:bodyPr rtlCol="0" anchor="ctr"/>
+          <a:lstStyle/>
+          <a:p>
+            <a:pPr algn="ctr"/>
+            <a:endParaRPr lang="en-AU">
+              <a:solidFill>
+                <a:schemeClr val="tx1"/>
+              </a:solidFill>
+            </a:endParaRPr>
+          </a:p>
+        </p:txBody>
+      </p:sp>
+      <p:sp>
+        <p:nvSpPr>
+          <p:cNvPr id="40" name="Bent Arrow 39"/>
+          <p:cNvSpPr/>
+          <p:nvPr/>
+        </p:nvSpPr>
+        <p:spPr>
+          <a:xfrm flipH="1">
+            <a:off x="4740472" y="224002"/>
+            <a:ext cx="812959" cy="759865"/>
+          </a:xfrm>
+          <a:prstGeom prst="bentArrow">
+            <a:avLst/>
+          </a:prstGeom>
+          <a:solidFill>
+            <a:srgbClr val="FFC000"/>
+          </a:solidFill>
+          <a:ln>
+            <a:solidFill>
+              <a:srgbClr val="FFC000"/>
+            </a:solidFill>
+          </a:ln>
+        </p:spPr>
+        <p:style>
+          <a:lnRef idx="2">
+            <a:schemeClr val="accent1">
+              <a:shade val="50000"/>
+            </a:schemeClr>
+          </a:lnRef>
+          <a:fillRef idx="1">
+            <a:schemeClr val="accent1"/>
+          </a:fillRef>
+          <a:effectRef idx="0">
+            <a:schemeClr val="accent1"/>
+          </a:effectRef>
+          <a:fontRef idx="minor">
+            <a:schemeClr val="lt1"/>
+          </a:fontRef>
+        </p:style>
+        <p:txBody>
+          <a:bodyPr rtlCol="0" anchor="ctr"/>
+          <a:lstStyle/>
+          <a:p>
+            <a:pPr algn="ctr"/>
+            <a:endParaRPr lang="en-AU">
+              <a:solidFill>
+                <a:schemeClr val="tx1"/>
+              </a:solidFill>
+            </a:endParaRPr>
+          </a:p>
+        </p:txBody>
+      </p:sp>
+      <p:sp>
+        <p:nvSpPr>
+          <p:cNvPr id="41" name="Rounded Rectangle 40"/>
+          <p:cNvSpPr/>
+          <p:nvPr/>
+        </p:nvSpPr>
+        <p:spPr>
+          <a:xfrm>
+            <a:off x="7940317" y="121689"/>
+            <a:ext cx="3917637" cy="6545398"/>
+          </a:xfrm>
+          <a:prstGeom prst="roundRect">
+            <a:avLst/>
+          </a:prstGeom>
+          <a:solidFill>
+            <a:srgbClr val="45629E"/>
+          </a:solidFill>
+        </p:spPr>
+        <p:style>
+          <a:lnRef idx="2">
+            <a:schemeClr val="accent1">
+              <a:shade val="50000"/>
+            </a:schemeClr>
+          </a:lnRef>
+          <a:fillRef idx="1">
+            <a:schemeClr val="accent1"/>
+          </a:fillRef>
+          <a:effectRef idx="0">
+            <a:schemeClr val="accent1"/>
+          </a:effectRef>
+          <a:fontRef idx="minor">
+            <a:schemeClr val="lt1"/>
+          </a:fontRef>
+        </p:style>
+        <p:txBody>
+          <a:bodyPr rtlCol="0" anchor="ctr"/>
+          <a:lstStyle/>
+          <a:p>
+            <a:pPr algn="ctr"/>
+            <a:endParaRPr lang="en-AU"/>
+          </a:p>
+        </p:txBody>
+      </p:sp>
+      <p:sp>
+        <p:nvSpPr>
+          <p:cNvPr id="42" name="TextBox 41"/>
+          <p:cNvSpPr txBox="1"/>
+          <p:nvPr/>
+        </p:nvSpPr>
+        <p:spPr>
+          <a:xfrm>
+            <a:off x="9320062" y="80715"/>
+            <a:ext cx="1697901" cy="523220"/>
+          </a:xfrm>
+          <a:prstGeom prst="rect">
+            <a:avLst/>
+          </a:prstGeom>
+          <a:noFill/>
+        </p:spPr>
+        <p:txBody>
+          <a:bodyPr wrap="none" rtlCol="0">
+            <a:spAutoFit/>
+          </a:bodyPr>
+          <a:lstStyle/>
+          <a:p>
+            <a:r>
+              <a:rPr lang="en-US" sz="2800" dirty="0" smtClean="0">
+                <a:solidFill>
+                  <a:srgbClr val="FFC000"/>
+                </a:solidFill>
+              </a:rPr>
+              <a:t>Scenario </a:t>
+            </a:r>
+            <a:r>
+              <a:rPr lang="en-US" sz="2800" dirty="0" smtClean="0">
+                <a:solidFill>
+                  <a:srgbClr val="FFC000"/>
+                </a:solidFill>
+              </a:rPr>
+              <a:t>II</a:t>
+            </a:r>
+            <a:endParaRPr lang="en-US" sz="2800" dirty="0">
+              <a:solidFill>
+                <a:srgbClr val="FFC000"/>
+              </a:solidFill>
+            </a:endParaRPr>
+          </a:p>
+        </p:txBody>
+      </p:sp>
+      <p:sp>
+        <p:nvSpPr>
+          <p:cNvPr id="43" name="TextBox 42"/>
+          <p:cNvSpPr txBox="1"/>
+          <p:nvPr/>
+        </p:nvSpPr>
+        <p:spPr>
+          <a:xfrm>
+            <a:off x="8433917" y="641817"/>
+            <a:ext cx="3641510" cy="923330"/>
+          </a:xfrm>
+          <a:prstGeom prst="rect">
+            <a:avLst/>
+          </a:prstGeom>
+          <a:noFill/>
+        </p:spPr>
+        <p:txBody>
+          <a:bodyPr wrap="none" rtlCol="0">
+            <a:spAutoFit/>
+          </a:bodyPr>
+          <a:lstStyle/>
+          <a:p>
+            <a:r>
+              <a:rPr lang="en-US" dirty="0" smtClean="0">
+                <a:solidFill>
+                  <a:schemeClr val="bg1"/>
+                </a:solidFill>
+              </a:rPr>
+              <a:t>Penetrance </a:t>
+            </a:r>
+            <a:r>
+              <a:rPr lang="en-US" dirty="0" smtClean="0">
+                <a:solidFill>
+                  <a:schemeClr val="bg1"/>
+                </a:solidFill>
+              </a:rPr>
+              <a:t>model - the</a:t>
+            </a:r>
+            <a:r>
+              <a:rPr lang="en-US" dirty="0">
+                <a:solidFill>
+                  <a:schemeClr val="bg1"/>
+                </a:solidFill>
+              </a:rPr>
+              <a:t> </a:t>
+            </a:r>
+            <a:r>
+              <a:rPr lang="en-US" dirty="0" smtClean="0">
+                <a:solidFill>
+                  <a:schemeClr val="bg1"/>
+                </a:solidFill>
+              </a:rPr>
+              <a:t>probabilistic </a:t>
+            </a:r>
+          </a:p>
+          <a:p>
+            <a:r>
+              <a:rPr lang="en-US" dirty="0" smtClean="0">
+                <a:solidFill>
+                  <a:schemeClr val="bg1"/>
+                </a:solidFill>
+              </a:rPr>
+              <a:t>relationship between trait and QTL </a:t>
+            </a:r>
+          </a:p>
+          <a:p>
+            <a:r>
+              <a:rPr lang="en-US" dirty="0" smtClean="0">
+                <a:solidFill>
+                  <a:schemeClr val="bg1"/>
+                </a:solidFill>
+              </a:rPr>
+              <a:t>genotype</a:t>
+            </a:r>
+            <a:endParaRPr lang="en-US" dirty="0">
+              <a:solidFill>
+                <a:schemeClr val="bg1"/>
+              </a:solidFill>
+            </a:endParaRPr>
+          </a:p>
+        </p:txBody>
+      </p:sp>
+      <p:graphicFrame>
+        <p:nvGraphicFramePr>
+          <p:cNvPr id="44" name="Table 43"/>
+          <p:cNvGraphicFramePr>
+            <a:graphicFrameLocks noGrp="1"/>
+          </p:cNvGraphicFramePr>
+          <p:nvPr>
+            <p:extLst>
+              <p:ext uri="{D42A27DB-BD31-4B8C-83A1-F6EECF244321}">
+                <p14:modId xmlns:p14="http://schemas.microsoft.com/office/powerpoint/2010/main" val="3763575071"/>
+              </p:ext>
+            </p:extLst>
+          </p:nvPr>
+        </p:nvGraphicFramePr>
+        <p:xfrm>
+          <a:off x="8255813" y="1681879"/>
+          <a:ext cx="3550592" cy="1854200"/>
+        </p:xfrm>
+        <a:graphic>
+          <a:graphicData uri="http://schemas.openxmlformats.org/drawingml/2006/table">
+            <a:tbl>
+              <a:tblPr firstRow="1" bandRow="1">
+                <a:tableStyleId>{22838BEF-8BB2-4498-84A7-C5851F593DF1}</a:tableStyleId>
+              </a:tblPr>
+              <a:tblGrid>
+                <a:gridCol w="1325854"/>
+                <a:gridCol w="1114064"/>
+                <a:gridCol w="1110674"/>
+              </a:tblGrid>
+              <a:tr h="370840">
+                <a:tc rowSpan="2">
+                  <a:txBody>
+                    <a:bodyPr/>
+                    <a:lstStyle/>
+                    <a:p>
+                      <a:r>
+                        <a:rPr lang="en-US" dirty="0" smtClean="0"/>
+                        <a:t>QTL Genotype</a:t>
+                      </a:r>
+                      <a:endParaRPr lang="en-US" dirty="0"/>
+                    </a:p>
+                  </a:txBody>
+                  <a:tcPr/>
+                </a:tc>
+                <a:tc gridSpan="2">
+                  <a:txBody>
+                    <a:bodyPr/>
+                    <a:lstStyle/>
+                    <a:p>
+                      <a:pPr algn="ctr"/>
+                      <a:r>
+                        <a:rPr lang="en-US" dirty="0" smtClean="0"/>
+                        <a:t>Trait</a:t>
+                      </a:r>
+                      <a:endParaRPr lang="en-US" dirty="0"/>
+                    </a:p>
+                  </a:txBody>
+                  <a:tcPr/>
+                </a:tc>
+                <a:tc hMerge="1">
+                  <a:txBody>
+                    <a:bodyPr/>
+                    <a:lstStyle/>
+                    <a:p>
+                      <a:endParaRPr lang="en-US" dirty="0"/>
+                    </a:p>
+                  </a:txBody>
+                  <a:tcPr/>
+                </a:tc>
+              </a:tr>
+              <a:tr h="370840">
+                <a:tc vMerge="1">
+                  <a:txBody>
+                    <a:bodyPr/>
+                    <a:lstStyle/>
+                    <a:p>
+                      <a:endParaRPr lang="en-US" dirty="0"/>
+                    </a:p>
+                  </a:txBody>
+                  <a:tcPr/>
+                </a:tc>
+                <a:tc>
+                  <a:txBody>
+                    <a:bodyPr/>
+                    <a:lstStyle/>
+                    <a:p>
+                      <a:pPr algn="ctr"/>
+                      <a:r>
+                        <a:rPr lang="en-US" b="1" dirty="0" err="1" smtClean="0"/>
+                        <a:t>Aff</a:t>
+                      </a:r>
+                      <a:endParaRPr lang="en-US" b="1" dirty="0"/>
+                    </a:p>
+                  </a:txBody>
+                  <a:tcPr/>
+                </a:tc>
+                <a:tc>
+                  <a:txBody>
+                    <a:bodyPr/>
+                    <a:lstStyle/>
+                    <a:p>
+                      <a:pPr algn="ctr"/>
+                      <a:r>
+                        <a:rPr lang="en-US" b="1" dirty="0" err="1" smtClean="0"/>
+                        <a:t>Unaff</a:t>
+                      </a:r>
+                      <a:endParaRPr lang="en-US" b="1" dirty="0"/>
+                    </a:p>
+                  </a:txBody>
+                  <a:tcPr/>
+                </a:tc>
+              </a:tr>
+              <a:tr h="370840">
+                <a:tc>
+                  <a:txBody>
+                    <a:bodyPr/>
+                    <a:lstStyle/>
+                    <a:p>
+                      <a:r>
+                        <a:rPr lang="en-US" dirty="0" smtClean="0"/>
+                        <a:t>QQ</a:t>
+                      </a:r>
+                      <a:endParaRPr lang="en-US" dirty="0"/>
+                    </a:p>
+                  </a:txBody>
+                  <a:tcPr/>
+                </a:tc>
+                <a:tc>
+                  <a:txBody>
+                    <a:bodyPr/>
+                    <a:lstStyle/>
+                    <a:p>
+                      <a:pPr algn="ctr"/>
+                      <a:r>
+                        <a:rPr lang="en-US" dirty="0" smtClean="0">
+                          <a:solidFill>
+                            <a:schemeClr val="accent4">
+                              <a:lumMod val="75000"/>
+                            </a:schemeClr>
+                          </a:solidFill>
+                        </a:rPr>
+                        <a:t>0.95</a:t>
+                      </a:r>
+                      <a:endParaRPr lang="en-US" dirty="0">
+                        <a:solidFill>
+                          <a:schemeClr val="accent4">
+                            <a:lumMod val="75000"/>
+                          </a:schemeClr>
+                        </a:solidFill>
+                      </a:endParaRPr>
+                    </a:p>
+                  </a:txBody>
+                  <a:tcPr/>
+                </a:tc>
+                <a:tc>
+                  <a:txBody>
+                    <a:bodyPr/>
+                    <a:lstStyle/>
+                    <a:p>
+                      <a:pPr algn="ctr"/>
+                      <a:r>
+                        <a:rPr lang="en-US" dirty="0" smtClean="0">
+                          <a:solidFill>
+                            <a:schemeClr val="accent4">
+                              <a:lumMod val="75000"/>
+                            </a:schemeClr>
+                          </a:solidFill>
+                        </a:rPr>
+                        <a:t>0.05</a:t>
+                      </a:r>
+                      <a:endParaRPr lang="en-US" dirty="0">
+                        <a:solidFill>
+                          <a:schemeClr val="accent4">
+                            <a:lumMod val="75000"/>
+                          </a:schemeClr>
+                        </a:solidFill>
+                      </a:endParaRPr>
+                    </a:p>
+                  </a:txBody>
+                  <a:tcPr/>
+                </a:tc>
+              </a:tr>
+              <a:tr h="370840">
+                <a:tc>
+                  <a:txBody>
+                    <a:bodyPr/>
+                    <a:lstStyle/>
+                    <a:p>
+                      <a:r>
+                        <a:rPr lang="en-US" dirty="0" err="1" smtClean="0"/>
+                        <a:t>Qq</a:t>
+                      </a:r>
+                      <a:endParaRPr lang="en-US" dirty="0"/>
+                    </a:p>
+                  </a:txBody>
+                  <a:tcPr/>
+                </a:tc>
+                <a:tc>
+                  <a:txBody>
+                    <a:bodyPr/>
+                    <a:lstStyle/>
+                    <a:p>
+                      <a:pPr algn="ctr"/>
+                      <a:r>
+                        <a:rPr lang="en-US" dirty="0" smtClean="0"/>
+                        <a:t>1.0</a:t>
+                      </a:r>
+                      <a:endParaRPr lang="en-US" dirty="0"/>
+                    </a:p>
+                  </a:txBody>
+                  <a:tcPr/>
+                </a:tc>
+                <a:tc>
+                  <a:txBody>
+                    <a:bodyPr/>
+                    <a:lstStyle/>
+                    <a:p>
+                      <a:pPr algn="ctr"/>
+                      <a:r>
+                        <a:rPr lang="en-US" dirty="0" smtClean="0"/>
+                        <a:t>0.0</a:t>
+                      </a:r>
+                      <a:endParaRPr lang="en-US" dirty="0"/>
+                    </a:p>
+                  </a:txBody>
+                  <a:tcPr/>
+                </a:tc>
+              </a:tr>
+              <a:tr h="370840">
+                <a:tc>
+                  <a:txBody>
+                    <a:bodyPr/>
+                    <a:lstStyle/>
+                    <a:p>
+                      <a:r>
+                        <a:rPr lang="en-US" dirty="0" err="1" smtClean="0"/>
+                        <a:t>qq</a:t>
+                      </a:r>
+                      <a:endParaRPr lang="en-US" dirty="0"/>
+                    </a:p>
+                  </a:txBody>
+                  <a:tcPr/>
+                </a:tc>
+                <a:tc>
+                  <a:txBody>
+                    <a:bodyPr/>
+                    <a:lstStyle/>
+                    <a:p>
+                      <a:pPr algn="ctr"/>
+                      <a:r>
+                        <a:rPr lang="en-US" dirty="0" smtClean="0"/>
+                        <a:t>0.0</a:t>
+                      </a:r>
+                      <a:endParaRPr lang="en-US" dirty="0"/>
+                    </a:p>
+                  </a:txBody>
+                  <a:tcPr/>
+                </a:tc>
+                <a:tc>
+                  <a:txBody>
+                    <a:bodyPr/>
+                    <a:lstStyle/>
+                    <a:p>
+                      <a:pPr algn="ctr"/>
+                      <a:r>
+                        <a:rPr lang="en-US" dirty="0" smtClean="0"/>
+                        <a:t>1.0</a:t>
+                      </a:r>
+                      <a:endParaRPr lang="en-US" dirty="0"/>
+                    </a:p>
+                  </a:txBody>
+                  <a:tcPr/>
+                </a:tc>
+              </a:tr>
+            </a:tbl>
+          </a:graphicData>
+        </a:graphic>
+      </p:graphicFrame>
+      <p:sp>
+        <p:nvSpPr>
+          <p:cNvPr id="45" name="TextBox 44"/>
+          <p:cNvSpPr txBox="1"/>
+          <p:nvPr/>
+        </p:nvSpPr>
+        <p:spPr>
+          <a:xfrm>
+            <a:off x="8515567" y="3608061"/>
+            <a:ext cx="3633967" cy="830997"/>
+          </a:xfrm>
+          <a:prstGeom prst="rect">
+            <a:avLst/>
+          </a:prstGeom>
+          <a:noFill/>
+        </p:spPr>
+        <p:txBody>
+          <a:bodyPr wrap="square" rtlCol="0">
+            <a:spAutoFit/>
+          </a:bodyPr>
+          <a:lstStyle/>
+          <a:p>
+            <a:r>
+              <a:rPr lang="en-US" sz="1600" dirty="0" smtClean="0">
+                <a:solidFill>
+                  <a:schemeClr val="bg1"/>
+                </a:solidFill>
+              </a:rPr>
+              <a:t>Allowable QTL alleles </a:t>
+            </a:r>
+            <a:r>
+              <a:rPr lang="en-US" sz="1600" dirty="0" smtClean="0">
+                <a:solidFill>
+                  <a:schemeClr val="bg1"/>
+                </a:solidFill>
+              </a:rPr>
+              <a:t>consistent </a:t>
+            </a:r>
+            <a:r>
+              <a:rPr lang="en-US" sz="1600" dirty="0" smtClean="0">
+                <a:solidFill>
+                  <a:schemeClr val="bg1"/>
+                </a:solidFill>
+              </a:rPr>
+              <a:t>w</a:t>
+            </a:r>
+            <a:r>
+              <a:rPr lang="en-US" sz="1600" dirty="0" smtClean="0">
+                <a:solidFill>
+                  <a:schemeClr val="bg1"/>
+                </a:solidFill>
+              </a:rPr>
+              <a:t>ith observed disease status,  phased marker genotypes </a:t>
+            </a:r>
+            <a:r>
+              <a:rPr lang="en-US" sz="1600" dirty="0" smtClean="0">
+                <a:solidFill>
+                  <a:schemeClr val="bg1"/>
+                </a:solidFill>
+              </a:rPr>
+              <a:t>and </a:t>
+            </a:r>
+            <a:r>
+              <a:rPr lang="en-US" sz="1600" dirty="0" smtClean="0">
+                <a:solidFill>
+                  <a:schemeClr val="bg1"/>
+                </a:solidFill>
+              </a:rPr>
+              <a:t>penetrance </a:t>
+            </a:r>
+            <a:r>
+              <a:rPr lang="en-US" sz="1600" dirty="0" smtClean="0">
+                <a:solidFill>
+                  <a:schemeClr val="bg1"/>
+                </a:solidFill>
+              </a:rPr>
+              <a:t>model</a:t>
+            </a:r>
+            <a:endParaRPr lang="en-US" sz="1600" dirty="0">
+              <a:solidFill>
+                <a:schemeClr val="bg1"/>
+              </a:solidFill>
+            </a:endParaRPr>
+          </a:p>
+        </p:txBody>
+      </p:sp>
+      <p:graphicFrame>
+        <p:nvGraphicFramePr>
+          <p:cNvPr id="46" name="Table 45"/>
+          <p:cNvGraphicFramePr>
+            <a:graphicFrameLocks noGrp="1"/>
+          </p:cNvGraphicFramePr>
+          <p:nvPr>
+            <p:extLst>
+              <p:ext uri="{D42A27DB-BD31-4B8C-83A1-F6EECF244321}">
+                <p14:modId xmlns:p14="http://schemas.microsoft.com/office/powerpoint/2010/main" val="629872290"/>
+              </p:ext>
+            </p:extLst>
+          </p:nvPr>
+        </p:nvGraphicFramePr>
+        <p:xfrm>
+          <a:off x="8003233" y="4405610"/>
+          <a:ext cx="3939040" cy="2392060"/>
+        </p:xfrm>
+        <a:graphic>
+          <a:graphicData uri="http://schemas.openxmlformats.org/drawingml/2006/table">
+            <a:tbl>
+              <a:tblPr firstRow="1" bandRow="1">
+                <a:tableStyleId>{EB9631B5-78F2-41C9-869B-9F39066F8104}</a:tableStyleId>
+              </a:tblPr>
+              <a:tblGrid>
+                <a:gridCol w="1162507"/>
+                <a:gridCol w="394881"/>
+                <a:gridCol w="793884"/>
+                <a:gridCol w="793884"/>
+                <a:gridCol w="793884"/>
+              </a:tblGrid>
+              <a:tr h="428039">
+                <a:tc rowSpan="2">
+                  <a:txBody>
+                    <a:bodyPr/>
+                    <a:lstStyle/>
+                    <a:p>
+                      <a:r>
+                        <a:rPr lang="en-US" sz="1600" dirty="0" smtClean="0"/>
+                        <a:t>Marker</a:t>
+                      </a:r>
+                      <a:r>
+                        <a:rPr lang="en-US" sz="1600" baseline="0" dirty="0" smtClean="0"/>
+                        <a:t> </a:t>
+                      </a:r>
+                    </a:p>
+                    <a:p>
+                      <a:r>
+                        <a:rPr lang="en-US" sz="1600" baseline="0" dirty="0" smtClean="0"/>
+                        <a:t>Haplotype</a:t>
+                      </a:r>
+                      <a:endParaRPr lang="en-US" sz="1600" dirty="0"/>
+                    </a:p>
+                  </a:txBody>
+                  <a:tcPr anchor="b">
+                    <a:lnL>
+                      <a:noFill/>
+                    </a:lnL>
+                    <a:lnR>
+                      <a:noFill/>
+                    </a:lnR>
+                    <a:lnT w="25400" cmpd="sng">
+                      <a:noFill/>
+                    </a:lnT>
+                    <a:lnB w="12700" cap="flat" cmpd="sng" algn="ctr">
+                      <a:solidFill>
+                        <a:schemeClr val="tx1"/>
+                      </a:solidFill>
+                      <a:prstDash val="solid"/>
+                      <a:round/>
+                      <a:headEnd type="none" w="med" len="med"/>
+                      <a:tailEnd type="none" w="med" len="med"/>
+                    </a:lnB>
+                    <a:lnTlToBr w="12700" cmpd="sng">
+                      <a:noFill/>
+                      <a:prstDash val="solid"/>
+                    </a:lnTlToBr>
+                    <a:lnBlToTr w="12700" cmpd="sng">
+                      <a:noFill/>
+                      <a:prstDash val="solid"/>
+                    </a:lnBlToTr>
+                  </a:tcPr>
+                </a:tc>
+                <a:tc gridSpan="4">
+                  <a:txBody>
+                    <a:bodyPr/>
+                    <a:lstStyle/>
+                    <a:p>
+                      <a:pPr algn="ctr"/>
+                      <a:r>
+                        <a:rPr lang="en-US" sz="1600" dirty="0" smtClean="0"/>
+                        <a:t>QTL allele configurations</a:t>
+                      </a:r>
+                      <a:endParaRPr lang="en-US" sz="1600" dirty="0"/>
+                    </a:p>
+                  </a:txBody>
+                  <a:tcPr anchor="b">
+                    <a:lnL>
+                      <a:noFill/>
+                    </a:lnL>
+                    <a:lnR>
+                      <a:noFill/>
+                    </a:lnR>
+                    <a:lnT w="28575" cap="flat" cmpd="sng" algn="ctr">
+                      <a:noFill/>
+                      <a:prstDash val="solid"/>
+                      <a:round/>
+                      <a:headEnd type="none" w="med" len="med"/>
+                      <a:tailEnd type="none" w="med" len="med"/>
+                    </a:lnT>
+                    <a:lnB w="12700" cap="flat" cmpd="sng" algn="ctr">
+                      <a:solidFill>
+                        <a:schemeClr val="tx1"/>
+                      </a:solidFill>
+                      <a:prstDash val="solid"/>
+                      <a:round/>
+                      <a:headEnd type="none" w="med" len="med"/>
+                      <a:tailEnd type="none" w="med" len="med"/>
+                    </a:lnB>
+                    <a:lnTlToBr w="12700" cmpd="sng">
+                      <a:noFill/>
+                      <a:prstDash val="solid"/>
+                    </a:lnTlToBr>
+                    <a:lnBlToTr w="12700" cmpd="sng">
+                      <a:noFill/>
+                      <a:prstDash val="solid"/>
+                    </a:lnBlToTr>
+                  </a:tcPr>
+                </a:tc>
+                <a:tc hMerge="1">
+                  <a:txBody>
+                    <a:bodyPr/>
+                    <a:lstStyle/>
+                    <a:p>
+                      <a:pPr algn="ctr"/>
+                      <a:endParaRPr lang="en-US" sz="1600" dirty="0"/>
+                    </a:p>
+                  </a:txBody>
+                  <a:tcPr/>
+                </a:tc>
+                <a:tc hMerge="1">
+                  <a:txBody>
+                    <a:bodyPr/>
+                    <a:lstStyle/>
+                    <a:p>
+                      <a:pPr algn="ctr"/>
+                      <a:endParaRPr lang="en-US" sz="1600" dirty="0"/>
+                    </a:p>
+                  </a:txBody>
+                  <a:tcPr/>
+                </a:tc>
+                <a:tc hMerge="1">
+                  <a:txBody>
+                    <a:bodyPr/>
+                    <a:lstStyle/>
+                    <a:p>
+                      <a:pPr algn="ctr"/>
+                      <a:endParaRPr lang="en-US" sz="1600" dirty="0"/>
+                    </a:p>
+                  </a:txBody>
+                  <a:tcPr/>
+                </a:tc>
+              </a:tr>
+              <a:tr h="500981">
+                <a:tc vMerge="1">
+                  <a:txBody>
+                    <a:bodyPr/>
+                    <a:lstStyle/>
+                    <a:p>
+                      <a:endParaRPr lang="en-US" sz="1600" dirty="0"/>
+                    </a:p>
+                  </a:txBody>
+                  <a:tcPr anchor="b">
+                    <a:lnL>
+                      <a:noFill/>
+                    </a:lnL>
+                    <a:lnR>
+                      <a:noFill/>
+                    </a:lnR>
+                    <a:lnT w="25400" cmpd="sng">
+                      <a:noFill/>
+                    </a:lnT>
+                    <a:lnB w="12700" cap="flat" cmpd="sng" algn="ctr">
+                      <a:solidFill>
+                        <a:schemeClr val="tx1"/>
+                      </a:solidFill>
+                      <a:prstDash val="solid"/>
+                      <a:round/>
+                      <a:headEnd type="none" w="med" len="med"/>
+                      <a:tailEnd type="none" w="med" len="med"/>
+                    </a:lnB>
+                    <a:lnTlToBr w="12700" cmpd="sng">
+                      <a:noFill/>
+                      <a:prstDash val="solid"/>
+                    </a:lnTlToBr>
+                    <a:lnBlToTr w="12700" cmpd="sng">
+                      <a:noFill/>
+                      <a:prstDash val="solid"/>
+                    </a:lnBlToTr>
+                    <a:solidFill>
+                      <a:srgbClr val="FFC000"/>
+                    </a:solidFill>
+                  </a:tcPr>
+                </a:tc>
+                <a:tc>
+                  <a:txBody>
+                    <a:bodyPr/>
+                    <a:lstStyle/>
+                    <a:p>
+                      <a:pPr algn="ctr"/>
+                      <a:r>
+                        <a:rPr lang="en-US" sz="1600" dirty="0" err="1" smtClean="0">
+                          <a:solidFill>
+                            <a:schemeClr val="bg1"/>
+                          </a:solidFill>
+                        </a:rPr>
+                        <a:t>i</a:t>
+                      </a:r>
+                      <a:endParaRPr lang="en-US" sz="1600" dirty="0">
+                        <a:solidFill>
+                          <a:schemeClr val="bg1"/>
+                        </a:solidFill>
+                      </a:endParaRPr>
+                    </a:p>
+                  </a:txBody>
+                  <a:tcPr anchor="b">
+                    <a:lnL>
+                      <a:noFill/>
+                    </a:lnL>
+                    <a:lnR>
+                      <a:noFill/>
+                    </a:lnR>
+                    <a:lnT w="12700" cap="flat" cmpd="sng" algn="ctr">
+                      <a:solidFill>
+                        <a:schemeClr val="tx1"/>
+                      </a:solidFill>
+                      <a:prstDash val="solid"/>
+                      <a:round/>
+                      <a:headEnd type="none" w="med" len="med"/>
+                      <a:tailEnd type="none" w="med" len="med"/>
+                    </a:lnT>
+                    <a:lnB w="12700" cap="flat" cmpd="sng" algn="ctr">
+                      <a:solidFill>
+                        <a:schemeClr val="tx1"/>
+                      </a:solidFill>
+                      <a:prstDash val="solid"/>
+                      <a:round/>
+                      <a:headEnd type="none" w="med" len="med"/>
+                      <a:tailEnd type="none" w="med" len="med"/>
+                    </a:lnB>
+                    <a:lnTlToBr w="12700" cmpd="sng">
+                      <a:noFill/>
+                      <a:prstDash val="solid"/>
+                    </a:lnTlToBr>
+                    <a:lnBlToTr w="12700" cmpd="sng">
+                      <a:noFill/>
+                      <a:prstDash val="solid"/>
+                    </a:lnBlToTr>
+                    <a:solidFill>
+                      <a:srgbClr val="FFC000"/>
+                    </a:solidFill>
+                  </a:tcPr>
+                </a:tc>
+                <a:tc>
+                  <a:txBody>
+                    <a:bodyPr/>
+                    <a:lstStyle/>
+                    <a:p>
+                      <a:pPr algn="ctr"/>
+                      <a:r>
+                        <a:rPr lang="en-US" sz="1600" dirty="0" smtClean="0">
+                          <a:solidFill>
+                            <a:schemeClr val="bg1"/>
+                          </a:solidFill>
+                        </a:rPr>
+                        <a:t>ii</a:t>
+                      </a:r>
+                      <a:endParaRPr lang="en-US" sz="1600" dirty="0">
+                        <a:solidFill>
+                          <a:schemeClr val="bg1"/>
+                        </a:solidFill>
+                      </a:endParaRPr>
+                    </a:p>
+                  </a:txBody>
+                  <a:tcPr anchor="b">
+                    <a:lnL>
+                      <a:noFill/>
+                    </a:lnL>
+                    <a:lnR>
+                      <a:noFill/>
+                    </a:lnR>
+                    <a:lnT w="12700" cap="flat" cmpd="sng" algn="ctr">
+                      <a:solidFill>
+                        <a:schemeClr val="tx1"/>
+                      </a:solidFill>
+                      <a:prstDash val="solid"/>
+                      <a:round/>
+                      <a:headEnd type="none" w="med" len="med"/>
+                      <a:tailEnd type="none" w="med" len="med"/>
+                    </a:lnT>
+                    <a:lnB w="12700" cap="flat" cmpd="sng" algn="ctr">
+                      <a:solidFill>
+                        <a:schemeClr val="tx1"/>
+                      </a:solidFill>
+                      <a:prstDash val="solid"/>
+                      <a:round/>
+                      <a:headEnd type="none" w="med" len="med"/>
+                      <a:tailEnd type="none" w="med" len="med"/>
+                    </a:lnB>
+                    <a:lnTlToBr w="12700" cmpd="sng">
+                      <a:noFill/>
+                      <a:prstDash val="solid"/>
+                    </a:lnTlToBr>
+                    <a:lnBlToTr w="12700" cmpd="sng">
+                      <a:noFill/>
+                      <a:prstDash val="solid"/>
+                    </a:lnBlToTr>
+                    <a:solidFill>
+                      <a:srgbClr val="FFC000"/>
+                    </a:solidFill>
+                  </a:tcPr>
+                </a:tc>
+                <a:tc>
+                  <a:txBody>
+                    <a:bodyPr/>
+                    <a:lstStyle/>
+                    <a:p>
+                      <a:pPr algn="ctr"/>
+                      <a:r>
+                        <a:rPr lang="en-US" sz="1600" dirty="0" smtClean="0">
+                          <a:solidFill>
+                            <a:schemeClr val="bg1"/>
+                          </a:solidFill>
+                        </a:rPr>
+                        <a:t>iii</a:t>
+                      </a:r>
+                      <a:endParaRPr lang="en-US" sz="1600" dirty="0">
+                        <a:solidFill>
+                          <a:schemeClr val="bg1"/>
+                        </a:solidFill>
+                      </a:endParaRPr>
+                    </a:p>
+                  </a:txBody>
+                  <a:tcPr anchor="b">
+                    <a:lnL>
+                      <a:noFill/>
+                    </a:lnL>
+                    <a:lnR>
+                      <a:noFill/>
+                    </a:lnR>
+                    <a:lnT w="12700" cap="flat" cmpd="sng" algn="ctr">
+                      <a:solidFill>
+                        <a:schemeClr val="tx1"/>
+                      </a:solidFill>
+                      <a:prstDash val="solid"/>
+                      <a:round/>
+                      <a:headEnd type="none" w="med" len="med"/>
+                      <a:tailEnd type="none" w="med" len="med"/>
+                    </a:lnT>
+                    <a:lnB w="12700" cap="flat" cmpd="sng" algn="ctr">
+                      <a:solidFill>
+                        <a:schemeClr val="tx1"/>
+                      </a:solidFill>
+                      <a:prstDash val="solid"/>
+                      <a:round/>
+                      <a:headEnd type="none" w="med" len="med"/>
+                      <a:tailEnd type="none" w="med" len="med"/>
+                    </a:lnB>
+                    <a:lnTlToBr w="12700" cmpd="sng">
+                      <a:noFill/>
+                      <a:prstDash val="solid"/>
+                    </a:lnTlToBr>
+                    <a:lnBlToTr w="12700" cmpd="sng">
+                      <a:noFill/>
+                      <a:prstDash val="solid"/>
+                    </a:lnBlToTr>
+                    <a:solidFill>
+                      <a:srgbClr val="FFC000"/>
+                    </a:solidFill>
+                  </a:tcPr>
+                </a:tc>
+                <a:tc>
+                  <a:txBody>
+                    <a:bodyPr/>
+                    <a:lstStyle/>
+                    <a:p>
+                      <a:pPr algn="ctr"/>
+                      <a:r>
+                        <a:rPr lang="en-US" sz="1600" dirty="0" smtClean="0">
+                          <a:solidFill>
+                            <a:schemeClr val="bg1"/>
+                          </a:solidFill>
+                        </a:rPr>
+                        <a:t>iv</a:t>
+                      </a:r>
+                      <a:endParaRPr lang="en-US" sz="1600" dirty="0">
+                        <a:solidFill>
+                          <a:schemeClr val="bg1"/>
+                        </a:solidFill>
+                      </a:endParaRPr>
+                    </a:p>
+                  </a:txBody>
+                  <a:tcPr anchor="b">
+                    <a:lnL>
+                      <a:noFill/>
+                    </a:lnL>
+                    <a:lnR>
+                      <a:noFill/>
+                    </a:lnR>
+                    <a:lnT w="12700" cap="flat" cmpd="sng" algn="ctr">
+                      <a:solidFill>
+                        <a:schemeClr val="tx1"/>
+                      </a:solidFill>
+                      <a:prstDash val="solid"/>
+                      <a:round/>
+                      <a:headEnd type="none" w="med" len="med"/>
+                      <a:tailEnd type="none" w="med" len="med"/>
+                    </a:lnT>
+                    <a:lnB w="12700" cap="flat" cmpd="sng" algn="ctr">
+                      <a:solidFill>
+                        <a:schemeClr val="tx1"/>
+                      </a:solidFill>
+                      <a:prstDash val="solid"/>
+                      <a:round/>
+                      <a:headEnd type="none" w="med" len="med"/>
+                      <a:tailEnd type="none" w="med" len="med"/>
+                    </a:lnB>
+                    <a:lnTlToBr w="12700" cmpd="sng">
+                      <a:noFill/>
+                      <a:prstDash val="solid"/>
+                    </a:lnTlToBr>
+                    <a:lnBlToTr w="12700" cmpd="sng">
+                      <a:noFill/>
+                      <a:prstDash val="solid"/>
+                    </a:lnBlToTr>
+                    <a:solidFill>
+                      <a:srgbClr val="FFC000"/>
+                    </a:solidFill>
+                  </a:tcPr>
+                </a:tc>
+              </a:tr>
+              <a:tr h="316409">
+                <a:tc>
+                  <a:txBody>
+                    <a:bodyPr/>
+                    <a:lstStyle/>
+                    <a:p>
+                      <a:r>
+                        <a:rPr lang="en-US" dirty="0" smtClean="0"/>
+                        <a:t>g1</a:t>
+                      </a:r>
+                      <a:endParaRPr lang="en-US" dirty="0"/>
+                    </a:p>
+                  </a:txBody>
+                  <a:tcPr>
+                    <a:lnL>
+                      <a:noFill/>
+                    </a:lnL>
+                    <a:lnR>
+                      <a:noFill/>
+                    </a:lnR>
+                    <a:lnT w="12700" cap="flat" cmpd="sng" algn="ctr">
+                      <a:solidFill>
+                        <a:schemeClr val="tx1"/>
+                      </a:solidFill>
+                      <a:prstDash val="solid"/>
+                      <a:round/>
+                      <a:headEnd type="none" w="med" len="med"/>
+                      <a:tailEnd type="none" w="med" len="med"/>
+                    </a:lnT>
+                    <a:lnB>
+                      <a:noFill/>
+                    </a:lnB>
+                    <a:lnTlToBr w="12700" cmpd="sng">
+                      <a:noFill/>
+                      <a:prstDash val="solid"/>
+                    </a:lnTlToBr>
+                    <a:lnBlToTr w="12700" cmpd="sng">
+                      <a:noFill/>
+                      <a:prstDash val="solid"/>
+                    </a:lnBlToTr>
+                  </a:tcPr>
+                </a:tc>
+                <a:tc>
+                  <a:txBody>
+                    <a:bodyPr/>
+                    <a:lstStyle/>
+                    <a:p>
+                      <a:pPr algn="ctr"/>
+                      <a:r>
+                        <a:rPr lang="en-US" dirty="0" smtClean="0"/>
+                        <a:t>Q</a:t>
+                      </a:r>
+                      <a:endParaRPr lang="en-US" dirty="0"/>
+                    </a:p>
+                  </a:txBody>
+                  <a:tcPr>
+                    <a:lnL>
+                      <a:noFill/>
+                    </a:lnL>
+                    <a:lnR>
+                      <a:noFill/>
+                    </a:lnR>
+                    <a:lnT w="12700" cap="flat" cmpd="sng" algn="ctr">
+                      <a:solidFill>
+                        <a:schemeClr val="tx1"/>
+                      </a:solidFill>
+                      <a:prstDash val="solid"/>
+                      <a:round/>
+                      <a:headEnd type="none" w="med" len="med"/>
+                      <a:tailEnd type="none" w="med" len="med"/>
+                    </a:lnT>
+                    <a:lnB>
+                      <a:noFill/>
+                    </a:lnB>
+                    <a:lnTlToBr w="12700" cmpd="sng">
+                      <a:noFill/>
+                      <a:prstDash val="solid"/>
+                    </a:lnTlToBr>
+                    <a:lnBlToTr w="12700" cmpd="sng">
+                      <a:noFill/>
+                      <a:prstDash val="solid"/>
+                    </a:lnBlToTr>
+                  </a:tcPr>
+                </a:tc>
+                <a:tc>
+                  <a:txBody>
+                    <a:bodyPr/>
+                    <a:lstStyle/>
+                    <a:p>
+                      <a:pPr algn="ctr"/>
+                      <a:r>
+                        <a:rPr lang="en-US" dirty="0" smtClean="0"/>
+                        <a:t>Q</a:t>
+                      </a:r>
+                      <a:endParaRPr lang="en-US" dirty="0"/>
+                    </a:p>
+                  </a:txBody>
+                  <a:tcPr>
+                    <a:lnL>
+                      <a:noFill/>
+                    </a:lnL>
+                    <a:lnR>
+                      <a:noFill/>
+                    </a:lnR>
+                    <a:lnT w="12700" cap="flat" cmpd="sng" algn="ctr">
+                      <a:solidFill>
+                        <a:schemeClr val="tx1"/>
+                      </a:solidFill>
+                      <a:prstDash val="solid"/>
+                      <a:round/>
+                      <a:headEnd type="none" w="med" len="med"/>
+                      <a:tailEnd type="none" w="med" len="med"/>
+                    </a:lnT>
+                    <a:lnB>
+                      <a:noFill/>
+                    </a:lnB>
+                    <a:lnTlToBr w="12700" cmpd="sng">
+                      <a:noFill/>
+                      <a:prstDash val="solid"/>
+                    </a:lnTlToBr>
+                    <a:lnBlToTr w="12700" cmpd="sng">
+                      <a:noFill/>
+                      <a:prstDash val="solid"/>
+                    </a:lnBlToTr>
+                  </a:tcPr>
+                </a:tc>
+                <a:tc>
+                  <a:txBody>
+                    <a:bodyPr/>
+                    <a:lstStyle/>
+                    <a:p>
+                      <a:pPr algn="ctr"/>
+                      <a:r>
+                        <a:rPr lang="en-US" dirty="0" smtClean="0"/>
+                        <a:t>q</a:t>
+                      </a:r>
+                      <a:endParaRPr lang="en-US" dirty="0"/>
+                    </a:p>
+                  </a:txBody>
+                  <a:tcPr>
+                    <a:lnL>
+                      <a:noFill/>
+                    </a:lnL>
+                    <a:lnR>
+                      <a:noFill/>
+                    </a:lnR>
+                    <a:lnT w="12700" cap="flat" cmpd="sng" algn="ctr">
+                      <a:solidFill>
+                        <a:schemeClr val="tx1"/>
+                      </a:solidFill>
+                      <a:prstDash val="solid"/>
+                      <a:round/>
+                      <a:headEnd type="none" w="med" len="med"/>
+                      <a:tailEnd type="none" w="med" len="med"/>
+                    </a:lnT>
+                    <a:lnB>
+                      <a:noFill/>
+                    </a:lnB>
+                    <a:lnTlToBr w="12700" cmpd="sng">
+                      <a:noFill/>
+                      <a:prstDash val="solid"/>
+                    </a:lnTlToBr>
+                    <a:lnBlToTr w="12700" cmpd="sng">
+                      <a:noFill/>
+                      <a:prstDash val="solid"/>
+                    </a:lnBlToTr>
+                  </a:tcPr>
+                </a:tc>
+                <a:tc>
+                  <a:txBody>
+                    <a:bodyPr/>
+                    <a:lstStyle/>
+                    <a:p>
+                      <a:pPr algn="ctr"/>
+                      <a:r>
+                        <a:rPr lang="en-US" dirty="0" smtClean="0"/>
+                        <a:t>q</a:t>
+                      </a:r>
+                      <a:endParaRPr lang="en-US" dirty="0"/>
+                    </a:p>
+                  </a:txBody>
+                  <a:tcPr>
+                    <a:lnL>
+                      <a:noFill/>
+                    </a:lnL>
+                    <a:lnR>
+                      <a:noFill/>
+                    </a:lnR>
+                    <a:lnT w="12700" cap="flat" cmpd="sng" algn="ctr">
+                      <a:solidFill>
+                        <a:schemeClr val="tx1"/>
+                      </a:solidFill>
+                      <a:prstDash val="solid"/>
+                      <a:round/>
+                      <a:headEnd type="none" w="med" len="med"/>
+                      <a:tailEnd type="none" w="med" len="med"/>
+                    </a:lnT>
+                    <a:lnB>
+                      <a:noFill/>
+                    </a:lnB>
+                    <a:lnTlToBr w="12700" cmpd="sng">
+                      <a:noFill/>
+                      <a:prstDash val="solid"/>
+                    </a:lnTlToBr>
+                    <a:lnBlToTr w="12700" cmpd="sng">
+                      <a:noFill/>
+                      <a:prstDash val="solid"/>
+                    </a:lnBlToTr>
+                  </a:tcPr>
+                </a:tc>
+              </a:tr>
+              <a:tr h="316409">
+                <a:tc>
+                  <a:txBody>
+                    <a:bodyPr/>
+                    <a:lstStyle/>
+                    <a:p>
+                      <a:r>
+                        <a:rPr lang="en-US" dirty="0" smtClean="0"/>
+                        <a:t>g2</a:t>
+                      </a:r>
+                      <a:endParaRPr lang="en-US" dirty="0"/>
+                    </a:p>
+                  </a:txBody>
+                  <a:tcPr>
+                    <a:lnL>
+                      <a:noFill/>
+                    </a:lnL>
+                    <a:lnR>
+                      <a:noFill/>
+                    </a:lnR>
+                    <a:lnT>
+                      <a:noFill/>
+                    </a:lnT>
+                    <a:lnB>
+                      <a:noFill/>
+                    </a:lnB>
+                    <a:lnTlToBr w="12700" cmpd="sng">
+                      <a:noFill/>
+                      <a:prstDash val="solid"/>
+                    </a:lnTlToBr>
+                    <a:lnBlToTr w="12700" cmpd="sng">
+                      <a:noFill/>
+                      <a:prstDash val="solid"/>
+                    </a:lnBlToTr>
+                  </a:tcPr>
+                </a:tc>
+                <a:tc>
+                  <a:txBody>
+                    <a:bodyPr/>
+                    <a:lstStyle/>
+                    <a:p>
+                      <a:pPr algn="ctr"/>
+                      <a:r>
+                        <a:rPr lang="en-US" dirty="0" smtClean="0"/>
+                        <a:t>Q</a:t>
+                      </a:r>
+                      <a:endParaRPr lang="en-US" dirty="0"/>
+                    </a:p>
+                  </a:txBody>
+                  <a:tcPr>
+                    <a:lnL>
+                      <a:noFill/>
+                    </a:lnL>
+                    <a:lnR>
+                      <a:noFill/>
+                    </a:lnR>
+                    <a:lnT>
+                      <a:noFill/>
+                    </a:lnT>
+                    <a:lnB>
+                      <a:noFill/>
+                    </a:lnB>
+                    <a:lnTlToBr w="12700" cmpd="sng">
+                      <a:noFill/>
+                      <a:prstDash val="solid"/>
+                    </a:lnTlToBr>
+                    <a:lnBlToTr w="12700" cmpd="sng">
+                      <a:noFill/>
+                      <a:prstDash val="solid"/>
+                    </a:lnBlToTr>
+                  </a:tcPr>
+                </a:tc>
+                <a:tc>
+                  <a:txBody>
+                    <a:bodyPr/>
+                    <a:lstStyle/>
+                    <a:p>
+                      <a:pPr algn="ctr"/>
+                      <a:r>
+                        <a:rPr lang="en-US" dirty="0" smtClean="0"/>
+                        <a:t>Q</a:t>
+                      </a:r>
+                      <a:endParaRPr lang="en-US" dirty="0"/>
+                    </a:p>
+                  </a:txBody>
+                  <a:tcPr>
+                    <a:lnL>
+                      <a:noFill/>
+                    </a:lnL>
+                    <a:lnR>
+                      <a:noFill/>
+                    </a:lnR>
+                    <a:lnT>
+                      <a:noFill/>
+                    </a:lnT>
+                    <a:lnB>
+                      <a:noFill/>
+                    </a:lnB>
+                    <a:lnTlToBr w="12700" cmpd="sng">
+                      <a:noFill/>
+                      <a:prstDash val="solid"/>
+                    </a:lnTlToBr>
+                    <a:lnBlToTr w="12700" cmpd="sng">
+                      <a:noFill/>
+                      <a:prstDash val="solid"/>
+                    </a:lnBlToTr>
+                  </a:tcPr>
+                </a:tc>
+                <a:tc>
+                  <a:txBody>
+                    <a:bodyPr/>
+                    <a:lstStyle/>
+                    <a:p>
+                      <a:pPr algn="ctr"/>
+                      <a:r>
+                        <a:rPr lang="en-US" dirty="0" smtClean="0"/>
+                        <a:t>Q</a:t>
+                      </a:r>
+                      <a:endParaRPr lang="en-US" dirty="0"/>
+                    </a:p>
+                  </a:txBody>
+                  <a:tcPr>
+                    <a:lnL>
+                      <a:noFill/>
+                    </a:lnL>
+                    <a:lnR>
+                      <a:noFill/>
+                    </a:lnR>
+                    <a:lnT>
+                      <a:noFill/>
+                    </a:lnT>
+                    <a:lnB>
+                      <a:noFill/>
+                    </a:lnB>
+                    <a:lnTlToBr w="12700" cmpd="sng">
+                      <a:noFill/>
+                      <a:prstDash val="solid"/>
+                    </a:lnTlToBr>
+                    <a:lnBlToTr w="12700" cmpd="sng">
+                      <a:noFill/>
+                      <a:prstDash val="solid"/>
+                    </a:lnBlToTr>
+                  </a:tcPr>
+                </a:tc>
+                <a:tc>
+                  <a:txBody>
+                    <a:bodyPr/>
+                    <a:lstStyle/>
+                    <a:p>
+                      <a:pPr algn="ctr"/>
+                      <a:r>
+                        <a:rPr lang="en-US" dirty="0" smtClean="0"/>
+                        <a:t>Q</a:t>
+                      </a:r>
+                      <a:endParaRPr lang="en-US" dirty="0"/>
+                    </a:p>
+                  </a:txBody>
+                  <a:tcPr>
+                    <a:lnL>
+                      <a:noFill/>
+                    </a:lnL>
+                    <a:lnR>
+                      <a:noFill/>
+                    </a:lnR>
+                    <a:lnT>
+                      <a:noFill/>
+                    </a:lnT>
+                    <a:lnB>
+                      <a:noFill/>
+                    </a:lnB>
+                    <a:lnTlToBr w="12700" cmpd="sng">
+                      <a:noFill/>
+                      <a:prstDash val="solid"/>
+                    </a:lnTlToBr>
+                    <a:lnBlToTr w="12700" cmpd="sng">
+                      <a:noFill/>
+                      <a:prstDash val="solid"/>
+                    </a:lnBlToTr>
+                  </a:tcPr>
+                </a:tc>
+              </a:tr>
+              <a:tr h="316409">
+                <a:tc>
+                  <a:txBody>
+                    <a:bodyPr/>
+                    <a:lstStyle/>
+                    <a:p>
+                      <a:r>
+                        <a:rPr lang="en-US" dirty="0" smtClean="0"/>
+                        <a:t>g3</a:t>
+                      </a:r>
+                      <a:endParaRPr lang="en-US" dirty="0"/>
+                    </a:p>
+                  </a:txBody>
+                  <a:tcPr>
+                    <a:lnL>
+                      <a:noFill/>
+                    </a:lnL>
+                    <a:lnR>
+                      <a:noFill/>
+                    </a:lnR>
+                    <a:lnT>
+                      <a:noFill/>
+                    </a:lnT>
+                    <a:lnB>
+                      <a:noFill/>
+                    </a:lnB>
+                    <a:lnTlToBr w="12700" cmpd="sng">
+                      <a:noFill/>
+                      <a:prstDash val="solid"/>
+                    </a:lnTlToBr>
+                    <a:lnBlToTr w="12700" cmpd="sng">
+                      <a:noFill/>
+                      <a:prstDash val="solid"/>
+                    </a:lnBlToTr>
+                  </a:tcPr>
+                </a:tc>
+                <a:tc>
+                  <a:txBody>
+                    <a:bodyPr/>
+                    <a:lstStyle/>
+                    <a:p>
+                      <a:pPr algn="ctr"/>
+                      <a:r>
+                        <a:rPr lang="en-US" dirty="0" smtClean="0"/>
+                        <a:t>Q</a:t>
+                      </a:r>
+                      <a:endParaRPr lang="en-US" dirty="0"/>
+                    </a:p>
+                  </a:txBody>
+                  <a:tcPr>
+                    <a:lnL>
+                      <a:noFill/>
+                    </a:lnL>
+                    <a:lnR>
+                      <a:noFill/>
+                    </a:lnR>
+                    <a:lnT>
+                      <a:noFill/>
+                    </a:lnT>
+                    <a:lnB>
+                      <a:noFill/>
+                    </a:lnB>
+                    <a:lnTlToBr w="12700" cmpd="sng">
+                      <a:noFill/>
+                      <a:prstDash val="solid"/>
+                    </a:lnTlToBr>
+                    <a:lnBlToTr w="12700" cmpd="sng">
+                      <a:noFill/>
+                      <a:prstDash val="solid"/>
+                    </a:lnBlToTr>
+                  </a:tcPr>
+                </a:tc>
+                <a:tc>
+                  <a:txBody>
+                    <a:bodyPr/>
+                    <a:lstStyle/>
+                    <a:p>
+                      <a:pPr algn="ctr"/>
+                      <a:r>
+                        <a:rPr lang="en-US" dirty="0" smtClean="0"/>
+                        <a:t>q</a:t>
+                      </a:r>
+                      <a:endParaRPr lang="en-US" dirty="0"/>
+                    </a:p>
+                  </a:txBody>
+                  <a:tcPr>
+                    <a:lnL>
+                      <a:noFill/>
+                    </a:lnL>
+                    <a:lnR>
+                      <a:noFill/>
+                    </a:lnR>
+                    <a:lnT>
+                      <a:noFill/>
+                    </a:lnT>
+                    <a:lnB>
+                      <a:noFill/>
+                    </a:lnB>
+                    <a:lnTlToBr w="12700" cmpd="sng">
+                      <a:noFill/>
+                      <a:prstDash val="solid"/>
+                    </a:lnTlToBr>
+                    <a:lnBlToTr w="12700" cmpd="sng">
+                      <a:noFill/>
+                      <a:prstDash val="solid"/>
+                    </a:lnBlToTr>
+                  </a:tcPr>
+                </a:tc>
+                <a:tc>
+                  <a:txBody>
+                    <a:bodyPr/>
+                    <a:lstStyle/>
+                    <a:p>
+                      <a:pPr algn="ctr"/>
+                      <a:r>
+                        <a:rPr lang="en-US" dirty="0" smtClean="0"/>
+                        <a:t>Q</a:t>
+                      </a:r>
+                      <a:endParaRPr lang="en-US" dirty="0"/>
+                    </a:p>
+                  </a:txBody>
+                  <a:tcPr>
+                    <a:lnL>
+                      <a:noFill/>
+                    </a:lnL>
+                    <a:lnR>
+                      <a:noFill/>
+                    </a:lnR>
+                    <a:lnT>
+                      <a:noFill/>
+                    </a:lnT>
+                    <a:lnB>
+                      <a:noFill/>
+                    </a:lnB>
+                    <a:lnTlToBr w="12700" cmpd="sng">
+                      <a:noFill/>
+                      <a:prstDash val="solid"/>
+                    </a:lnTlToBr>
+                    <a:lnBlToTr w="12700" cmpd="sng">
+                      <a:noFill/>
+                      <a:prstDash val="solid"/>
+                    </a:lnBlToTr>
+                  </a:tcPr>
+                </a:tc>
+                <a:tc>
+                  <a:txBody>
+                    <a:bodyPr/>
+                    <a:lstStyle/>
+                    <a:p>
+                      <a:pPr algn="ctr"/>
+                      <a:r>
+                        <a:rPr lang="en-US" dirty="0" smtClean="0"/>
+                        <a:t>q</a:t>
+                      </a:r>
+                      <a:endParaRPr lang="en-US" dirty="0"/>
+                    </a:p>
+                  </a:txBody>
+                  <a:tcPr>
+                    <a:lnL>
+                      <a:noFill/>
+                    </a:lnL>
+                    <a:lnR>
+                      <a:noFill/>
+                    </a:lnR>
+                    <a:lnT>
+                      <a:noFill/>
+                    </a:lnT>
+                    <a:lnB>
+                      <a:noFill/>
+                    </a:lnB>
+                    <a:lnTlToBr w="12700" cmpd="sng">
+                      <a:noFill/>
+                      <a:prstDash val="solid"/>
+                    </a:lnTlToBr>
+                    <a:lnBlToTr w="12700" cmpd="sng">
+                      <a:noFill/>
+                      <a:prstDash val="solid"/>
+                    </a:lnBlToTr>
+                  </a:tcPr>
+                </a:tc>
+              </a:tr>
+              <a:tr h="316409">
+                <a:tc>
+                  <a:txBody>
+                    <a:bodyPr/>
+                    <a:lstStyle/>
+                    <a:p>
+                      <a:r>
+                        <a:rPr lang="en-US" dirty="0" smtClean="0"/>
+                        <a:t>g4</a:t>
+                      </a:r>
+                      <a:endParaRPr lang="en-US" dirty="0"/>
+                    </a:p>
+                  </a:txBody>
+                  <a:tcPr>
+                    <a:lnL>
+                      <a:noFill/>
+                    </a:lnL>
+                    <a:lnR>
+                      <a:noFill/>
+                    </a:lnR>
+                    <a:lnT>
+                      <a:noFill/>
+                    </a:lnT>
+                    <a:lnB w="28575" cap="flat" cmpd="sng" algn="ctr">
+                      <a:solidFill>
+                        <a:schemeClr val="tx1"/>
+                      </a:solidFill>
+                      <a:prstDash val="solid"/>
+                      <a:round/>
+                      <a:headEnd type="none" w="med" len="med"/>
+                      <a:tailEnd type="none" w="med" len="med"/>
+                    </a:lnB>
+                    <a:lnTlToBr w="12700" cmpd="sng">
+                      <a:noFill/>
+                      <a:prstDash val="solid"/>
+                    </a:lnTlToBr>
+                    <a:lnBlToTr w="12700" cmpd="sng">
+                      <a:noFill/>
+                      <a:prstDash val="solid"/>
+                    </a:lnBlToTr>
+                  </a:tcPr>
+                </a:tc>
+                <a:tc>
+                  <a:txBody>
+                    <a:bodyPr/>
+                    <a:lstStyle/>
+                    <a:p>
+                      <a:pPr algn="ctr"/>
+                      <a:r>
+                        <a:rPr lang="en-US" dirty="0" smtClean="0"/>
+                        <a:t>Q</a:t>
+                      </a:r>
+                      <a:endParaRPr lang="en-US" dirty="0"/>
+                    </a:p>
+                  </a:txBody>
+                  <a:tcPr>
+                    <a:lnL>
+                      <a:noFill/>
+                    </a:lnL>
+                    <a:lnR>
+                      <a:noFill/>
+                    </a:lnR>
+                    <a:lnT>
+                      <a:noFill/>
+                    </a:lnT>
+                    <a:lnB w="28575" cap="flat" cmpd="sng" algn="ctr">
+                      <a:solidFill>
+                        <a:schemeClr val="tx1"/>
+                      </a:solidFill>
+                      <a:prstDash val="solid"/>
+                      <a:round/>
+                      <a:headEnd type="none" w="med" len="med"/>
+                      <a:tailEnd type="none" w="med" len="med"/>
+                    </a:lnB>
+                    <a:lnTlToBr w="12700" cmpd="sng">
+                      <a:noFill/>
+                      <a:prstDash val="solid"/>
+                    </a:lnTlToBr>
+                    <a:lnBlToTr w="12700" cmpd="sng">
+                      <a:noFill/>
+                      <a:prstDash val="solid"/>
+                    </a:lnBlToTr>
+                  </a:tcPr>
+                </a:tc>
+                <a:tc>
+                  <a:txBody>
+                    <a:bodyPr/>
+                    <a:lstStyle/>
+                    <a:p>
+                      <a:pPr algn="ctr"/>
+                      <a:r>
+                        <a:rPr lang="en-US" dirty="0" smtClean="0"/>
+                        <a:t>q</a:t>
+                      </a:r>
+                      <a:endParaRPr lang="en-US" dirty="0"/>
+                    </a:p>
+                  </a:txBody>
+                  <a:tcPr>
+                    <a:lnL>
+                      <a:noFill/>
+                    </a:lnL>
+                    <a:lnR>
+                      <a:noFill/>
+                    </a:lnR>
+                    <a:lnT>
+                      <a:noFill/>
+                    </a:lnT>
+                    <a:lnB w="28575" cap="flat" cmpd="sng" algn="ctr">
+                      <a:solidFill>
+                        <a:schemeClr val="tx1"/>
+                      </a:solidFill>
+                      <a:prstDash val="solid"/>
+                      <a:round/>
+                      <a:headEnd type="none" w="med" len="med"/>
+                      <a:tailEnd type="none" w="med" len="med"/>
+                    </a:lnB>
+                    <a:lnTlToBr w="12700" cmpd="sng">
+                      <a:noFill/>
+                      <a:prstDash val="solid"/>
+                    </a:lnTlToBr>
+                    <a:lnBlToTr w="12700" cmpd="sng">
+                      <a:noFill/>
+                      <a:prstDash val="solid"/>
+                    </a:lnBlToTr>
+                  </a:tcPr>
+                </a:tc>
+                <a:tc>
+                  <a:txBody>
+                    <a:bodyPr/>
+                    <a:lstStyle/>
+                    <a:p>
+                      <a:pPr algn="ctr"/>
+                      <a:r>
+                        <a:rPr lang="en-US" dirty="0" smtClean="0"/>
+                        <a:t>Q</a:t>
+                      </a:r>
+                      <a:endParaRPr lang="en-US" dirty="0"/>
+                    </a:p>
+                  </a:txBody>
+                  <a:tcPr>
+                    <a:lnL>
+                      <a:noFill/>
+                    </a:lnL>
+                    <a:lnR>
+                      <a:noFill/>
+                    </a:lnR>
+                    <a:lnT>
+                      <a:noFill/>
+                    </a:lnT>
+                    <a:lnB w="28575" cap="flat" cmpd="sng" algn="ctr">
+                      <a:solidFill>
+                        <a:schemeClr val="tx1"/>
+                      </a:solidFill>
+                      <a:prstDash val="solid"/>
+                      <a:round/>
+                      <a:headEnd type="none" w="med" len="med"/>
+                      <a:tailEnd type="none" w="med" len="med"/>
+                    </a:lnB>
+                    <a:lnTlToBr w="12700" cmpd="sng">
+                      <a:noFill/>
+                      <a:prstDash val="solid"/>
+                    </a:lnTlToBr>
+                    <a:lnBlToTr w="12700" cmpd="sng">
+                      <a:noFill/>
+                      <a:prstDash val="solid"/>
+                    </a:lnBlToTr>
+                  </a:tcPr>
+                </a:tc>
+                <a:tc>
+                  <a:txBody>
+                    <a:bodyPr/>
+                    <a:lstStyle/>
+                    <a:p>
+                      <a:pPr algn="ctr"/>
+                      <a:r>
+                        <a:rPr lang="en-US" dirty="0" smtClean="0"/>
+                        <a:t>q</a:t>
+                      </a:r>
+                      <a:endParaRPr lang="en-US" dirty="0"/>
+                    </a:p>
+                  </a:txBody>
+                  <a:tcPr>
+                    <a:lnL>
+                      <a:noFill/>
+                    </a:lnL>
+                    <a:lnR>
+                      <a:noFill/>
+                    </a:lnR>
+                    <a:lnT>
+                      <a:noFill/>
+                    </a:lnT>
+                    <a:lnB w="28575" cap="flat" cmpd="sng" algn="ctr">
+                      <a:solidFill>
+                        <a:schemeClr val="tx1"/>
+                      </a:solidFill>
+                      <a:prstDash val="solid"/>
+                      <a:round/>
+                      <a:headEnd type="none" w="med" len="med"/>
+                      <a:tailEnd type="none" w="med" len="med"/>
+                    </a:lnB>
+                    <a:lnTlToBr w="12700" cmpd="sng">
+                      <a:noFill/>
+                      <a:prstDash val="solid"/>
+                    </a:lnTlToBr>
+                    <a:lnBlToTr w="12700" cmpd="sng">
+                      <a:noFill/>
+                      <a:prstDash val="solid"/>
+                    </a:lnBlToTr>
+                  </a:tcPr>
+                </a:tc>
+              </a:tr>
+            </a:tbl>
+          </a:graphicData>
+        </a:graphic>
+      </p:graphicFrame>
+      <p:sp>
+        <p:nvSpPr>
+          <p:cNvPr id="47" name="TextBox 46"/>
+          <p:cNvSpPr txBox="1"/>
+          <p:nvPr/>
+        </p:nvSpPr>
+        <p:spPr>
+          <a:xfrm>
+            <a:off x="4054619" y="484703"/>
+            <a:ext cx="1260153" cy="646331"/>
+          </a:xfrm>
+          <a:prstGeom prst="rect">
+            <a:avLst/>
+          </a:prstGeom>
+          <a:noFill/>
+        </p:spPr>
+        <p:txBody>
+          <a:bodyPr wrap="none" rtlCol="0">
+            <a:spAutoFit/>
+          </a:bodyPr>
+          <a:lstStyle/>
+          <a:p>
+            <a:r>
+              <a:rPr lang="en-US" dirty="0" smtClean="0">
+                <a:solidFill>
+                  <a:srgbClr val="FFC000"/>
+                </a:solidFill>
+              </a:rPr>
+              <a:t>No </a:t>
+            </a:r>
+          </a:p>
+          <a:p>
+            <a:r>
+              <a:rPr lang="en-US" dirty="0" smtClean="0">
+                <a:solidFill>
+                  <a:srgbClr val="FFC000"/>
+                </a:solidFill>
+              </a:rPr>
+              <a:t>uncertainty</a:t>
+            </a:r>
+            <a:endParaRPr lang="en-AU" dirty="0">
+              <a:solidFill>
+                <a:srgbClr val="FFC000"/>
+              </a:solidFill>
+            </a:endParaRPr>
+          </a:p>
+        </p:txBody>
+      </p:sp>
+      <p:pic>
+        <p:nvPicPr>
+          <p:cNvPr id="52" name="Picture 51"/>
+          <p:cNvPicPr>
+            <a:picLocks noChangeAspect="1"/>
+          </p:cNvPicPr>
+          <p:nvPr/>
+        </p:nvPicPr>
+        <p:blipFill>
+          <a:blip r:embed="rId2"/>
+          <a:stretch>
+            <a:fillRect/>
+          </a:stretch>
+        </p:blipFill>
+        <p:spPr>
+          <a:xfrm>
+            <a:off x="4700439" y="4529385"/>
+            <a:ext cx="2322693" cy="1853148"/>
+          </a:xfrm>
+          <a:prstGeom prst="rect">
+            <a:avLst/>
+          </a:prstGeom>
+        </p:spPr>
+      </p:pic>
+      <p:sp>
+        <p:nvSpPr>
+          <p:cNvPr id="54" name="TextBox 53"/>
+          <p:cNvSpPr txBox="1"/>
+          <p:nvPr/>
+        </p:nvSpPr>
+        <p:spPr>
+          <a:xfrm>
+            <a:off x="4848705" y="6077446"/>
+            <a:ext cx="1442318" cy="307777"/>
+          </a:xfrm>
+          <a:prstGeom prst="rect">
+            <a:avLst/>
+          </a:prstGeom>
+          <a:noFill/>
+        </p:spPr>
+        <p:txBody>
+          <a:bodyPr wrap="none" rtlCol="0">
+            <a:spAutoFit/>
+          </a:bodyPr>
+          <a:lstStyle/>
+          <a:p>
+            <a:r>
+              <a:rPr lang="en-US" sz="1400" dirty="0">
                 <a:solidFill>
                   <a:srgbClr val="FF0000"/>
                 </a:solidFill>
               </a:rPr>
-              <a:t>Scenario 1</a:t>
-            </a:r>
+              <a:t>r</a:t>
+            </a:r>
+            <a:r>
+              <a:rPr lang="en-US" sz="1400" dirty="0" smtClean="0">
+                <a:solidFill>
+                  <a:srgbClr val="FF0000"/>
+                </a:solidFill>
+              </a:rPr>
+              <a:t>egion of interest</a:t>
+            </a:r>
+            <a:endParaRPr lang="en-AU" sz="1400" dirty="0">
+              <a:solidFill>
+                <a:srgbClr val="FF0000"/>
+              </a:solidFill>
+            </a:endParaRPr>
+          </a:p>
+        </p:txBody>
+      </p:sp>
+      <p:sp>
+        <p:nvSpPr>
+          <p:cNvPr id="55" name="Rectangle 54"/>
+          <p:cNvSpPr/>
+          <p:nvPr/>
+        </p:nvSpPr>
+        <p:spPr>
+          <a:xfrm>
+            <a:off x="5468878" y="4777049"/>
+            <a:ext cx="72000" cy="1368000"/>
+          </a:xfrm>
+          <a:prstGeom prst="rect">
+            <a:avLst/>
+          </a:prstGeom>
+          <a:solidFill>
+            <a:srgbClr val="FF0000">
+              <a:alpha val="58000"/>
+            </a:srgbClr>
+          </a:solidFill>
+          <a:ln>
+            <a:noFill/>
+          </a:ln>
+        </p:spPr>
+        <p:style>
+          <a:lnRef idx="2">
+            <a:schemeClr val="accent1">
+              <a:shade val="50000"/>
+            </a:schemeClr>
+          </a:lnRef>
+          <a:fillRef idx="1">
+            <a:schemeClr val="accent1"/>
+          </a:fillRef>
+          <a:effectRef idx="0">
+            <a:schemeClr val="accent1"/>
+          </a:effectRef>
+          <a:fontRef idx="minor">
+            <a:schemeClr val="lt1"/>
+          </a:fontRef>
+        </p:style>
+        <p:txBody>
+          <a:bodyPr rtlCol="0" anchor="ctr"/>
+          <a:lstStyle/>
+          <a:p>
+            <a:pPr algn="ctr"/>
+            <a:endParaRPr lang="en-AU"/>
+          </a:p>
+        </p:txBody>
+      </p:sp>
+      <p:sp>
+        <p:nvSpPr>
+          <p:cNvPr id="56" name="TextBox 55"/>
+          <p:cNvSpPr txBox="1"/>
+          <p:nvPr/>
+        </p:nvSpPr>
+        <p:spPr>
+          <a:xfrm>
+            <a:off x="6680164" y="479270"/>
+            <a:ext cx="1260153" cy="646331"/>
+          </a:xfrm>
+          <a:prstGeom prst="rect">
+            <a:avLst/>
+          </a:prstGeom>
+          <a:noFill/>
+        </p:spPr>
+        <p:txBody>
+          <a:bodyPr wrap="none" rtlCol="0">
+            <a:spAutoFit/>
+          </a:bodyPr>
+          <a:lstStyle/>
+          <a:p>
+            <a:r>
+              <a:rPr lang="en-US" dirty="0" smtClean="0">
+                <a:solidFill>
+                  <a:srgbClr val="FFC000"/>
+                </a:solidFill>
+              </a:rPr>
+              <a:t>Some</a:t>
+            </a:r>
+          </a:p>
+          <a:p>
+            <a:r>
+              <a:rPr lang="en-US" dirty="0" smtClean="0">
+                <a:solidFill>
+                  <a:srgbClr val="FFC000"/>
+                </a:solidFill>
+              </a:rPr>
+              <a:t>uncertainty</a:t>
+            </a:r>
+            <a:endParaRPr lang="en-AU" dirty="0">
+              <a:solidFill>
+                <a:srgbClr val="FFC000"/>
+              </a:solidFill>
+            </a:endParaRPr>
           </a:p>
         </p:txBody>
       </p:sp>

</xml_diff>